<commit_message>
Change port number & README.md
</commit_message>
<xml_diff>
--- a/images.pptx
+++ b/images.pptx
@@ -3343,6 +3343,22 @@
             </a:r>
             <a:endParaRPr lang="en-US" altLang="ja-JP" dirty="0" smtClean="0"/>
           </a:p>
+          <a:p>
+            <a:pPr algn="ctr"/>
+            <a:r>
+              <a:rPr lang="en-US" altLang="ja-JP" dirty="0" smtClean="0"/>
+              <a:t>(/</a:t>
+            </a:r>
+            <a:r>
+              <a:rPr lang="en-US" altLang="ja-JP" dirty="0" err="1" smtClean="0"/>
+              <a:t>api</a:t>
+            </a:r>
+            <a:r>
+              <a:rPr lang="en-US" altLang="ja-JP" dirty="0" smtClean="0"/>
+              <a:t>-a)</a:t>
+            </a:r>
+            <a:endParaRPr lang="en-US" altLang="ja-JP" dirty="0" smtClean="0"/>
+          </a:p>
         </p:txBody>
       </p:sp>
       <p:sp>
@@ -3387,6 +3403,22 @@
               <a:rPr lang="en-US" altLang="ja-JP" dirty="0" smtClean="0"/>
               <a:t>-client</a:t>
             </a:r>
+          </a:p>
+          <a:p>
+            <a:pPr algn="ctr"/>
+            <a:r>
+              <a:rPr lang="en-US" altLang="ja-JP" dirty="0" smtClean="0"/>
+              <a:t>(/</a:t>
+            </a:r>
+            <a:r>
+              <a:rPr lang="en-US" altLang="ja-JP" dirty="0" err="1" smtClean="0"/>
+              <a:t>api</a:t>
+            </a:r>
+            <a:r>
+              <a:rPr lang="en-US" altLang="ja-JP" dirty="0" smtClean="0"/>
+              <a:t>-c)</a:t>
+            </a:r>
+            <a:endParaRPr lang="en-US" altLang="ja-JP" dirty="0" smtClean="0"/>
           </a:p>
         </p:txBody>
       </p:sp>
@@ -3764,8 +3796,8 @@
           <a:lstStyle/>
           <a:p>
             <a:r>
-              <a:rPr kumimoji="1" lang="en-US" altLang="ja-JP" smtClean="0"/>
-              <a:t>8080</a:t>
+              <a:rPr kumimoji="1" lang="en-US" altLang="ja-JP" dirty="0" smtClean="0"/>
+              <a:t>8081</a:t>
             </a:r>
             <a:endParaRPr kumimoji="1" lang="ja-JP" altLang="en-US" dirty="0"/>
           </a:p>
@@ -3795,7 +3827,7 @@
           <a:p>
             <a:r>
               <a:rPr kumimoji="1" lang="en-US" altLang="ja-JP" dirty="0" smtClean="0"/>
-              <a:t>8081</a:t>
+              <a:t>8082</a:t>
             </a:r>
             <a:endParaRPr kumimoji="1" lang="ja-JP" altLang="en-US" dirty="0"/>
           </a:p>
@@ -3824,8 +3856,8 @@
           <a:lstStyle/>
           <a:p>
             <a:r>
-              <a:rPr kumimoji="1" lang="en-US" altLang="ja-JP" smtClean="0"/>
-              <a:t>8082</a:t>
+              <a:rPr kumimoji="1" lang="en-US" altLang="ja-JP" dirty="0" smtClean="0"/>
+              <a:t>8083</a:t>
             </a:r>
             <a:endParaRPr kumimoji="1" lang="ja-JP" altLang="en-US" dirty="0"/>
           </a:p>

</xml_diff>

<commit_message>
Support PostgreSQL in document
</commit_message>
<xml_diff>
--- a/images.pptx
+++ b/images.pptx
@@ -197,7 +197,7 @@
           <a:p>
             <a:fld id="{BC451F63-61CF-B94D-955A-F098561CC757}" type="datetimeFigureOut">
               <a:rPr kumimoji="1" lang="ja-JP" altLang="en-US" smtClean="0"/>
-              <a:t>2016/2/28</a:t>
+              <a:t>2016/3/5</a:t>
             </a:fld>
             <a:endParaRPr kumimoji="1" lang="ja-JP" altLang="en-US"/>
           </a:p>
@@ -712,7 +712,7 @@
           <a:p>
             <a:fld id="{D2D8EA25-67A6-EA48-A0F9-B2976239D8A5}" type="datetimeFigureOut">
               <a:rPr kumimoji="1" lang="ja-JP" altLang="en-US" smtClean="0"/>
-              <a:t>2016/2/28</a:t>
+              <a:t>2016/3/5</a:t>
             </a:fld>
             <a:endParaRPr kumimoji="1" lang="ja-JP" altLang="en-US"/>
           </a:p>
@@ -914,7 +914,7 @@
           <a:p>
             <a:fld id="{D2D8EA25-67A6-EA48-A0F9-B2976239D8A5}" type="datetimeFigureOut">
               <a:rPr kumimoji="1" lang="ja-JP" altLang="en-US" smtClean="0"/>
-              <a:t>2016/2/28</a:t>
+              <a:t>2016/3/5</a:t>
             </a:fld>
             <a:endParaRPr kumimoji="1" lang="ja-JP" altLang="en-US"/>
           </a:p>
@@ -1126,7 +1126,7 @@
           <a:p>
             <a:fld id="{D2D8EA25-67A6-EA48-A0F9-B2976239D8A5}" type="datetimeFigureOut">
               <a:rPr kumimoji="1" lang="ja-JP" altLang="en-US" smtClean="0"/>
-              <a:t>2016/2/28</a:t>
+              <a:t>2016/3/5</a:t>
             </a:fld>
             <a:endParaRPr kumimoji="1" lang="ja-JP" altLang="en-US"/>
           </a:p>
@@ -1328,7 +1328,7 @@
           <a:p>
             <a:fld id="{D2D8EA25-67A6-EA48-A0F9-B2976239D8A5}" type="datetimeFigureOut">
               <a:rPr kumimoji="1" lang="ja-JP" altLang="en-US" smtClean="0"/>
-              <a:t>2016/2/28</a:t>
+              <a:t>2016/3/5</a:t>
             </a:fld>
             <a:endParaRPr kumimoji="1" lang="ja-JP" altLang="en-US"/>
           </a:p>
@@ -1574,7 +1574,7 @@
           <a:p>
             <a:fld id="{D2D8EA25-67A6-EA48-A0F9-B2976239D8A5}" type="datetimeFigureOut">
               <a:rPr kumimoji="1" lang="ja-JP" altLang="en-US" smtClean="0"/>
-              <a:t>2016/2/28</a:t>
+              <a:t>2016/3/5</a:t>
             </a:fld>
             <a:endParaRPr kumimoji="1" lang="ja-JP" altLang="en-US"/>
           </a:p>
@@ -1870,7 +1870,7 @@
           <a:p>
             <a:fld id="{D2D8EA25-67A6-EA48-A0F9-B2976239D8A5}" type="datetimeFigureOut">
               <a:rPr kumimoji="1" lang="ja-JP" altLang="en-US" smtClean="0"/>
-              <a:t>2016/2/28</a:t>
+              <a:t>2016/3/5</a:t>
             </a:fld>
             <a:endParaRPr kumimoji="1" lang="ja-JP" altLang="en-US"/>
           </a:p>
@@ -2301,7 +2301,7 @@
           <a:p>
             <a:fld id="{D2D8EA25-67A6-EA48-A0F9-B2976239D8A5}" type="datetimeFigureOut">
               <a:rPr kumimoji="1" lang="ja-JP" altLang="en-US" smtClean="0"/>
-              <a:t>2016/2/28</a:t>
+              <a:t>2016/3/5</a:t>
             </a:fld>
             <a:endParaRPr kumimoji="1" lang="ja-JP" altLang="en-US"/>
           </a:p>
@@ -2419,7 +2419,7 @@
           <a:p>
             <a:fld id="{D2D8EA25-67A6-EA48-A0F9-B2976239D8A5}" type="datetimeFigureOut">
               <a:rPr kumimoji="1" lang="ja-JP" altLang="en-US" smtClean="0"/>
-              <a:t>2016/2/28</a:t>
+              <a:t>2016/3/5</a:t>
             </a:fld>
             <a:endParaRPr kumimoji="1" lang="ja-JP" altLang="en-US"/>
           </a:p>
@@ -2514,7 +2514,7 @@
           <a:p>
             <a:fld id="{D2D8EA25-67A6-EA48-A0F9-B2976239D8A5}" type="datetimeFigureOut">
               <a:rPr kumimoji="1" lang="ja-JP" altLang="en-US" smtClean="0"/>
-              <a:t>2016/2/28</a:t>
+              <a:t>2016/3/5</a:t>
             </a:fld>
             <a:endParaRPr kumimoji="1" lang="ja-JP" altLang="en-US"/>
           </a:p>
@@ -2823,7 +2823,7 @@
           <a:p>
             <a:fld id="{D2D8EA25-67A6-EA48-A0F9-B2976239D8A5}" type="datetimeFigureOut">
               <a:rPr kumimoji="1" lang="ja-JP" altLang="en-US" smtClean="0"/>
-              <a:t>2016/2/28</a:t>
+              <a:t>2016/3/5</a:t>
             </a:fld>
             <a:endParaRPr kumimoji="1" lang="ja-JP" altLang="en-US"/>
           </a:p>
@@ -3076,7 +3076,7 @@
           <a:p>
             <a:fld id="{D2D8EA25-67A6-EA48-A0F9-B2976239D8A5}" type="datetimeFigureOut">
               <a:rPr kumimoji="1" lang="ja-JP" altLang="en-US" smtClean="0"/>
-              <a:t>2016/2/28</a:t>
+              <a:t>2016/3/5</a:t>
             </a:fld>
             <a:endParaRPr kumimoji="1" lang="ja-JP" altLang="en-US"/>
           </a:p>
@@ -3321,7 +3321,7 @@
           <a:p>
             <a:fld id="{D2D8EA25-67A6-EA48-A0F9-B2976239D8A5}" type="datetimeFigureOut">
               <a:rPr kumimoji="1" lang="ja-JP" altLang="en-US" smtClean="0"/>
-              <a:t>2016/2/28</a:t>
+              <a:t>2016/3/5</a:t>
             </a:fld>
             <a:endParaRPr kumimoji="1" lang="ja-JP" altLang="en-US"/>
           </a:p>
@@ -4108,8 +4108,8 @@
         </p:nvSpPr>
         <p:spPr>
           <a:xfrm>
-            <a:off x="1056830" y="5664349"/>
-            <a:ext cx="9824941" cy="1096855"/>
+            <a:off x="6791567" y="5978982"/>
+            <a:ext cx="3637920" cy="1096855"/>
           </a:xfrm>
           <a:prstGeom prst="can">
             <a:avLst/>
@@ -4165,7 +4165,7 @@
         </p:nvSpPr>
         <p:spPr>
           <a:xfrm>
-            <a:off x="6814675" y="6608027"/>
+            <a:off x="7416449" y="7169347"/>
             <a:ext cx="1176388" cy="629167"/>
           </a:xfrm>
           <a:prstGeom prst="rect">
@@ -4207,7 +4207,7 @@
         </p:nvSpPr>
         <p:spPr>
           <a:xfrm>
-            <a:off x="5183144" y="6618301"/>
+            <a:off x="5529278" y="7179621"/>
             <a:ext cx="1176389" cy="618893"/>
           </a:xfrm>
           <a:prstGeom prst="rect">
@@ -4249,8 +4249,8 @@
         </p:nvSpPr>
         <p:spPr>
           <a:xfrm>
-            <a:off x="178399" y="7554384"/>
-            <a:ext cx="11177859" cy="1016484"/>
+            <a:off x="178399" y="8134488"/>
+            <a:ext cx="11803502" cy="1016484"/>
           </a:xfrm>
           <a:prstGeom prst="rect">
             <a:avLst/>
@@ -4481,7 +4481,7 @@
         <p:spPr>
           <a:xfrm>
             <a:off x="4064683" y="5070080"/>
-            <a:ext cx="0" cy="604096"/>
+            <a:ext cx="0" cy="658549"/>
           </a:xfrm>
           <a:prstGeom prst="straightConnector1">
             <a:avLst/>
@@ -4561,7 +4561,7 @@
         <p:spPr>
           <a:xfrm>
             <a:off x="6109476" y="3661788"/>
-            <a:ext cx="0" cy="2012388"/>
+            <a:ext cx="0" cy="2066841"/>
           </a:xfrm>
           <a:prstGeom prst="straightConnector1">
             <a:avLst/>
@@ -4601,7 +4601,7 @@
         <p:spPr>
           <a:xfrm>
             <a:off x="8116145" y="3651514"/>
-            <a:ext cx="0" cy="2022662"/>
+            <a:ext cx="0" cy="2077115"/>
           </a:xfrm>
           <a:prstGeom prst="straightConnector1">
             <a:avLst/>
@@ -5126,7 +5126,7 @@
         </p:nvSpPr>
         <p:spPr>
           <a:xfrm>
-            <a:off x="3470824" y="6618301"/>
+            <a:off x="3735101" y="7179712"/>
             <a:ext cx="1176389" cy="618893"/>
           </a:xfrm>
           <a:prstGeom prst="rect">
@@ -5176,7 +5176,7 @@
         </p:nvSpPr>
         <p:spPr>
           <a:xfrm>
-            <a:off x="132599" y="7037902"/>
+            <a:off x="90167" y="9235276"/>
             <a:ext cx="3066377" cy="369332"/>
           </a:xfrm>
           <a:prstGeom prst="rect">
@@ -5215,18 +5215,18 @@
           <p:cNvPr id="131" name="直線矢印コネクタ 130"/>
           <p:cNvCxnSpPr>
             <a:stCxn id="6" idx="1"/>
-            <a:endCxn id="11" idx="2"/>
+            <a:endCxn id="86" idx="1"/>
           </p:cNvCxnSpPr>
           <p:nvPr/>
         </p:nvCxnSpPr>
         <p:spPr>
           <a:xfrm rot="10800000" flipV="1">
-            <a:off x="1056831" y="3194313"/>
-            <a:ext cx="1118817" cy="3018463"/>
+            <a:off x="522031" y="3194314"/>
+            <a:ext cx="1653616" cy="3616974"/>
           </a:xfrm>
           <a:prstGeom prst="bentConnector3">
             <a:avLst>
-              <a:gd name="adj1" fmla="val 161736"/>
+              <a:gd name="adj1" fmla="val 120365"/>
             </a:avLst>
           </a:prstGeom>
           <a:ln w="38100">
@@ -5261,7 +5261,7 @@
         </p:nvSpPr>
         <p:spPr>
           <a:xfrm>
-            <a:off x="10450442" y="4983900"/>
+            <a:off x="10430778" y="4177654"/>
             <a:ext cx="1458936" cy="914400"/>
           </a:xfrm>
           <a:prstGeom prst="roundRect">
@@ -5317,7 +5317,7 @@
         </p:nvSpPr>
         <p:spPr>
           <a:xfrm>
-            <a:off x="5701444" y="5622862"/>
+            <a:off x="8306515" y="5935958"/>
             <a:ext cx="825867" cy="369332"/>
           </a:xfrm>
           <a:prstGeom prst="rect">
@@ -5348,9 +5348,9 @@
           <p:nvPr/>
         </p:nvCxnSpPr>
         <p:spPr>
-          <a:xfrm>
-            <a:off x="11179910" y="556708"/>
-            <a:ext cx="0" cy="4427192"/>
+          <a:xfrm flipH="1">
+            <a:off x="11160246" y="224558"/>
+            <a:ext cx="1" cy="3953096"/>
           </a:xfrm>
           <a:prstGeom prst="straightConnector1">
             <a:avLst/>
@@ -5388,7 +5388,7 @@
         </p:nvSpPr>
         <p:spPr>
           <a:xfrm>
-            <a:off x="11285657" y="4674444"/>
+            <a:off x="11265993" y="3868198"/>
             <a:ext cx="825867" cy="369332"/>
           </a:xfrm>
           <a:prstGeom prst="rect">
@@ -5477,7 +5477,7 @@
         </p:nvSpPr>
         <p:spPr>
           <a:xfrm>
-            <a:off x="1497774" y="7793531"/>
+            <a:off x="1261798" y="8373635"/>
             <a:ext cx="1117436" cy="594722"/>
           </a:xfrm>
           <a:prstGeom prst="roundRect">
@@ -5518,7 +5518,7 @@
         </p:nvSpPr>
         <p:spPr>
           <a:xfrm>
-            <a:off x="2776850" y="7797138"/>
+            <a:off x="2540874" y="8377242"/>
             <a:ext cx="939885" cy="591116"/>
           </a:xfrm>
           <a:prstGeom prst="can">
@@ -5560,7 +5560,7 @@
         </p:nvSpPr>
         <p:spPr>
           <a:xfrm>
-            <a:off x="3946626" y="7793532"/>
+            <a:off x="3710650" y="8373636"/>
             <a:ext cx="811805" cy="594722"/>
           </a:xfrm>
           <a:prstGeom prst="rect">
@@ -5602,7 +5602,7 @@
         </p:nvCxnSpPr>
         <p:spPr>
           <a:xfrm>
-            <a:off x="8040295" y="8312673"/>
+            <a:off x="8944863" y="8892777"/>
             <a:ext cx="817620" cy="0"/>
           </a:xfrm>
           <a:prstGeom prst="straightConnector1">
@@ -5641,7 +5641,7 @@
         </p:nvSpPr>
         <p:spPr>
           <a:xfrm>
-            <a:off x="8121969" y="7819577"/>
+            <a:off x="9026537" y="8399681"/>
             <a:ext cx="671979" cy="461665"/>
           </a:xfrm>
           <a:prstGeom prst="rect">
@@ -5677,7 +5677,7 @@
         </p:nvCxnSpPr>
         <p:spPr>
           <a:xfrm>
-            <a:off x="10071588" y="8312309"/>
+            <a:off x="10976156" y="8892413"/>
             <a:ext cx="817620" cy="0"/>
           </a:xfrm>
           <a:prstGeom prst="straightConnector1">
@@ -5715,7 +5715,7 @@
         </p:nvSpPr>
         <p:spPr>
           <a:xfrm>
-            <a:off x="10129816" y="7944899"/>
+            <a:off x="11034384" y="8525003"/>
             <a:ext cx="569387" cy="276999"/>
           </a:xfrm>
           <a:prstGeom prst="rect">
@@ -5745,7 +5745,7 @@
         </p:nvCxnSpPr>
         <p:spPr>
           <a:xfrm>
-            <a:off x="9069779" y="8312409"/>
+            <a:off x="9974347" y="8892513"/>
             <a:ext cx="817620" cy="0"/>
           </a:xfrm>
           <a:prstGeom prst="straightConnector1">
@@ -5784,7 +5784,7 @@
         </p:nvSpPr>
         <p:spPr>
           <a:xfrm>
-            <a:off x="9151453" y="7831036"/>
+            <a:off x="10056021" y="8411140"/>
             <a:ext cx="692818" cy="461665"/>
           </a:xfrm>
           <a:prstGeom prst="rect">
@@ -5867,7 +5867,7 @@
         </p:nvSpPr>
         <p:spPr>
           <a:xfrm>
-            <a:off x="156744" y="7554221"/>
+            <a:off x="156744" y="8134325"/>
             <a:ext cx="1037463" cy="369332"/>
           </a:xfrm>
           <a:prstGeom prst="rect">
@@ -6273,7 +6273,7 @@
         </p:blipFill>
         <p:spPr bwMode="auto">
           <a:xfrm>
-            <a:off x="11565863" y="5630653"/>
+            <a:off x="11506566" y="4818767"/>
             <a:ext cx="475335" cy="338999"/>
           </a:xfrm>
           <a:prstGeom prst="rect">
@@ -6352,7 +6352,7 @@
         </p:blipFill>
         <p:spPr bwMode="auto">
           <a:xfrm>
-            <a:off x="5014377" y="7905268"/>
+            <a:off x="4778401" y="8485372"/>
             <a:ext cx="777823" cy="219547"/>
           </a:xfrm>
           <a:prstGeom prst="rect">
@@ -6395,7 +6395,7 @@
         </p:blipFill>
         <p:spPr bwMode="auto">
           <a:xfrm>
-            <a:off x="6135422" y="7809975"/>
+            <a:off x="5899446" y="8390079"/>
             <a:ext cx="475335" cy="338999"/>
           </a:xfrm>
           <a:prstGeom prst="rect">
@@ -6421,7 +6421,7 @@
         </p:nvSpPr>
         <p:spPr>
           <a:xfrm>
-            <a:off x="4918399" y="8156202"/>
+            <a:off x="4682423" y="8736306"/>
             <a:ext cx="970137" cy="276999"/>
           </a:xfrm>
           <a:prstGeom prst="rect">
@@ -6436,12 +6436,8 @@
           <a:lstStyle/>
           <a:p>
             <a:r>
-              <a:rPr lang="en-US" altLang="ja-JP" sz="1200" smtClean="0"/>
-              <a:t>Apache </a:t>
-            </a:r>
-            <a:r>
-              <a:rPr lang="en-US" altLang="ja-JP" sz="1200" smtClean="0"/>
-              <a:t>2.2</a:t>
+              <a:rPr lang="en-US" altLang="ja-JP" sz="1200" dirty="0" smtClean="0"/>
+              <a:t>Apache 2.2</a:t>
             </a:r>
             <a:endParaRPr kumimoji="1" lang="ja-JP" altLang="en-US" sz="1200" dirty="0"/>
           </a:p>
@@ -6455,7 +6451,7 @@
         </p:nvSpPr>
         <p:spPr>
           <a:xfrm>
-            <a:off x="5898978" y="8160559"/>
+            <a:off x="5663002" y="8740663"/>
             <a:ext cx="974947" cy="276999"/>
           </a:xfrm>
           <a:prstGeom prst="rect">
@@ -6471,11 +6467,7 @@
           <a:p>
             <a:r>
               <a:rPr lang="en-US" altLang="ja-JP" sz="1200" smtClean="0"/>
-              <a:t>Tomcat </a:t>
-            </a:r>
-            <a:r>
-              <a:rPr lang="en-US" altLang="ja-JP" sz="1200" smtClean="0"/>
-              <a:t>8.0</a:t>
+              <a:t>Tomcat 8.0</a:t>
             </a:r>
             <a:endParaRPr kumimoji="1" lang="ja-JP" altLang="en-US" sz="1200" dirty="0"/>
           </a:p>
@@ -6504,7 +6496,7 @@
         </p:blipFill>
         <p:spPr bwMode="auto">
           <a:xfrm>
-            <a:off x="10098614" y="6266395"/>
+            <a:off x="9717150" y="6625308"/>
             <a:ext cx="661640" cy="360010"/>
           </a:xfrm>
           <a:prstGeom prst="rect">
@@ -6545,8 +6537,8 @@
         </p:blipFill>
         <p:spPr bwMode="auto">
           <a:xfrm>
-            <a:off x="7081294" y="7798252"/>
-            <a:ext cx="627034" cy="341180"/>
+            <a:off x="8028927" y="8370013"/>
+            <a:ext cx="657855" cy="357950"/>
           </a:xfrm>
           <a:prstGeom prst="rect">
             <a:avLst/>
@@ -6571,7 +6563,7 @@
         </p:nvSpPr>
         <p:spPr>
           <a:xfrm>
-            <a:off x="7062232" y="8162086"/>
+            <a:off x="8048229" y="8736307"/>
             <a:ext cx="638315" cy="276999"/>
           </a:xfrm>
           <a:prstGeom prst="rect">
@@ -6587,7 +6579,7 @@
           <a:p>
             <a:pPr algn="ctr"/>
             <a:r>
-              <a:rPr lang="en-US" altLang="ja-JP" sz="1200" smtClean="0"/>
+              <a:rPr lang="en-US" altLang="ja-JP" sz="1200" dirty="0" smtClean="0"/>
               <a:t>H2 1.4</a:t>
             </a:r>
             <a:endParaRPr kumimoji="1" lang="ja-JP" altLang="en-US" sz="1200" dirty="0"/>
@@ -6818,47 +6810,6 @@
           </a:p>
         </p:txBody>
       </p:sp>
-      <p:cxnSp>
-        <p:nvCxnSpPr>
-          <p:cNvPr id="87" name="直線矢印コネクタ 130"/>
-          <p:cNvCxnSpPr>
-            <a:stCxn id="36" idx="2"/>
-            <a:endCxn id="11" idx="4"/>
-          </p:cNvCxnSpPr>
-          <p:nvPr/>
-        </p:nvCxnSpPr>
-        <p:spPr>
-          <a:xfrm rot="5400000">
-            <a:off x="10873603" y="5906469"/>
-            <a:ext cx="314477" cy="298139"/>
-          </a:xfrm>
-          <a:prstGeom prst="bentConnector2">
-            <a:avLst/>
-          </a:prstGeom>
-          <a:ln w="38100">
-            <a:solidFill>
-              <a:schemeClr val="bg1">
-                <a:lumMod val="65000"/>
-              </a:schemeClr>
-            </a:solidFill>
-            <a:tailEnd type="triangle"/>
-          </a:ln>
-        </p:spPr>
-        <p:style>
-          <a:lnRef idx="1">
-            <a:schemeClr val="accent1"/>
-          </a:lnRef>
-          <a:fillRef idx="0">
-            <a:schemeClr val="accent1"/>
-          </a:fillRef>
-          <a:effectRef idx="0">
-            <a:schemeClr val="accent1"/>
-          </a:effectRef>
-          <a:fontRef idx="minor">
-            <a:schemeClr val="tx1"/>
-          </a:fontRef>
-        </p:style>
-      </p:cxnSp>
       <p:sp>
         <p:nvSpPr>
           <p:cNvPr id="93" name="正方形/長方形 92"/>
@@ -6947,6 +6898,297 @@
                 <a:schemeClr val="tx1">
                   <a:lumMod val="50000"/>
                   <a:lumOff val="50000"/>
+                </a:schemeClr>
+              </a:solidFill>
+            </a:endParaRPr>
+          </a:p>
+        </p:txBody>
+      </p:sp>
+      <p:sp>
+        <p:nvSpPr>
+          <p:cNvPr id="86" name="正方形/長方形 85"/>
+          <p:cNvSpPr/>
+          <p:nvPr/>
+        </p:nvSpPr>
+        <p:spPr>
+          <a:xfrm>
+            <a:off x="522031" y="5728629"/>
+            <a:ext cx="11188188" cy="2165318"/>
+          </a:xfrm>
+          <a:prstGeom prst="rect">
+            <a:avLst/>
+          </a:prstGeom>
+          <a:noFill/>
+          <a:ln w="28575">
+            <a:solidFill>
+              <a:schemeClr val="tx1">
+                <a:lumMod val="65000"/>
+                <a:lumOff val="35000"/>
+              </a:schemeClr>
+            </a:solidFill>
+            <a:prstDash val="dash"/>
+          </a:ln>
+        </p:spPr>
+        <p:style>
+          <a:lnRef idx="2">
+            <a:schemeClr val="accent1">
+              <a:shade val="50000"/>
+            </a:schemeClr>
+          </a:lnRef>
+          <a:fillRef idx="1">
+            <a:schemeClr val="accent1"/>
+          </a:fillRef>
+          <a:effectRef idx="0">
+            <a:schemeClr val="accent1"/>
+          </a:effectRef>
+          <a:fontRef idx="minor">
+            <a:schemeClr val="lt1"/>
+          </a:fontRef>
+        </p:style>
+        <p:txBody>
+          <a:bodyPr rtlCol="0" anchor="ctr"/>
+          <a:lstStyle/>
+          <a:p>
+            <a:pPr algn="ctr"/>
+            <a:endParaRPr kumimoji="1" lang="ja-JP" altLang="en-US"/>
+          </a:p>
+        </p:txBody>
+      </p:sp>
+      <p:sp>
+        <p:nvSpPr>
+          <p:cNvPr id="90" name="円柱 89"/>
+          <p:cNvSpPr/>
+          <p:nvPr/>
+        </p:nvSpPr>
+        <p:spPr>
+          <a:xfrm>
+            <a:off x="1815623" y="6004048"/>
+            <a:ext cx="3637920" cy="1096855"/>
+          </a:xfrm>
+          <a:prstGeom prst="can">
+            <a:avLst/>
+          </a:prstGeom>
+        </p:spPr>
+        <p:style>
+          <a:lnRef idx="1">
+            <a:schemeClr val="accent3"/>
+          </a:lnRef>
+          <a:fillRef idx="2">
+            <a:schemeClr val="accent3"/>
+          </a:fillRef>
+          <a:effectRef idx="1">
+            <a:schemeClr val="accent3"/>
+          </a:effectRef>
+          <a:fontRef idx="minor">
+            <a:schemeClr val="dk1"/>
+          </a:fontRef>
+        </p:style>
+        <p:txBody>
+          <a:bodyPr rtlCol="0" anchor="ctr"/>
+          <a:lstStyle/>
+          <a:p>
+            <a:pPr algn="ctr"/>
+            <a:r>
+              <a:rPr lang="en-US" altLang="ja-JP" dirty="0" smtClean="0"/>
+              <a:t>PostgreSQL </a:t>
+            </a:r>
+          </a:p>
+          <a:p>
+            <a:pPr algn="ctr"/>
+            <a:r>
+              <a:rPr lang="en-US" altLang="ja-JP" dirty="0" smtClean="0"/>
+              <a:t>(on Amazon RDS)</a:t>
+            </a:r>
+            <a:endParaRPr lang="en-US" altLang="ja-JP" dirty="0" smtClean="0"/>
+          </a:p>
+        </p:txBody>
+      </p:sp>
+      <p:sp>
+        <p:nvSpPr>
+          <p:cNvPr id="91" name="テキスト ボックス 90"/>
+          <p:cNvSpPr txBox="1"/>
+          <p:nvPr/>
+        </p:nvSpPr>
+        <p:spPr>
+          <a:xfrm>
+            <a:off x="3333927" y="5972442"/>
+            <a:ext cx="697627" cy="369332"/>
+          </a:xfrm>
+          <a:prstGeom prst="rect">
+            <a:avLst/>
+          </a:prstGeom>
+          <a:noFill/>
+        </p:spPr>
+        <p:txBody>
+          <a:bodyPr wrap="none" rtlCol="0">
+            <a:spAutoFit/>
+          </a:bodyPr>
+          <a:lstStyle/>
+          <a:p>
+            <a:r>
+              <a:rPr kumimoji="1" lang="en-US" altLang="ja-JP" smtClean="0"/>
+              <a:t>5432</a:t>
+            </a:r>
+            <a:endParaRPr kumimoji="1" lang="ja-JP" altLang="en-US" dirty="0"/>
+          </a:p>
+        </p:txBody>
+      </p:sp>
+      <p:cxnSp>
+        <p:nvCxnSpPr>
+          <p:cNvPr id="99" name="直線矢印コネクタ 98"/>
+          <p:cNvCxnSpPr>
+            <a:stCxn id="36" idx="2"/>
+            <a:endCxn id="11" idx="4"/>
+          </p:cNvCxnSpPr>
+          <p:nvPr/>
+        </p:nvCxnSpPr>
+        <p:spPr>
+          <a:xfrm rot="5400000">
+            <a:off x="10077189" y="5444353"/>
+            <a:ext cx="1435356" cy="730759"/>
+          </a:xfrm>
+          <a:prstGeom prst="bentConnector2">
+            <a:avLst/>
+          </a:prstGeom>
+          <a:ln w="38100">
+            <a:solidFill>
+              <a:schemeClr val="bg1">
+                <a:lumMod val="65000"/>
+              </a:schemeClr>
+            </a:solidFill>
+            <a:tailEnd type="triangle"/>
+          </a:ln>
+        </p:spPr>
+        <p:style>
+          <a:lnRef idx="1">
+            <a:schemeClr val="accent1"/>
+          </a:lnRef>
+          <a:fillRef idx="0">
+            <a:schemeClr val="accent1"/>
+          </a:fillRef>
+          <a:effectRef idx="0">
+            <a:schemeClr val="accent1"/>
+          </a:effectRef>
+          <a:fontRef idx="minor">
+            <a:schemeClr val="tx1"/>
+          </a:fontRef>
+        </p:style>
+      </p:cxnSp>
+      <p:pic>
+        <p:nvPicPr>
+          <p:cNvPr id="96" name="図 95"/>
+          <p:cNvPicPr>
+            <a:picLocks noChangeAspect="1"/>
+          </p:cNvPicPr>
+          <p:nvPr/>
+        </p:nvPicPr>
+        <p:blipFill>
+          <a:blip r:embed="rId7"/>
+          <a:stretch>
+            <a:fillRect/>
+          </a:stretch>
+        </p:blipFill>
+        <p:spPr>
+          <a:xfrm>
+            <a:off x="6954786" y="8370665"/>
+            <a:ext cx="647369" cy="375474"/>
+          </a:xfrm>
+          <a:prstGeom prst="rect">
+            <a:avLst/>
+          </a:prstGeom>
+        </p:spPr>
+      </p:pic>
+      <p:sp>
+        <p:nvSpPr>
+          <p:cNvPr id="109" name="テキスト ボックス 108"/>
+          <p:cNvSpPr txBox="1"/>
+          <p:nvPr/>
+        </p:nvSpPr>
+        <p:spPr>
+          <a:xfrm>
+            <a:off x="6668522" y="8734249"/>
+            <a:ext cx="1285929" cy="276999"/>
+          </a:xfrm>
+          <a:prstGeom prst="rect">
+            <a:avLst/>
+          </a:prstGeom>
+          <a:noFill/>
+        </p:spPr>
+        <p:txBody>
+          <a:bodyPr wrap="none" rtlCol="0">
+            <a:spAutoFit/>
+          </a:bodyPr>
+          <a:lstStyle/>
+          <a:p>
+            <a:pPr algn="ctr"/>
+            <a:r>
+              <a:rPr kumimoji="1" lang="en-US" altLang="ja-JP" sz="1200" dirty="0" smtClean="0"/>
+              <a:t>PostgreSQL 9.4</a:t>
+            </a:r>
+            <a:endParaRPr kumimoji="1" lang="ja-JP" altLang="en-US" sz="1200" dirty="0"/>
+          </a:p>
+        </p:txBody>
+      </p:sp>
+      <p:pic>
+        <p:nvPicPr>
+          <p:cNvPr id="110" name="図 109"/>
+          <p:cNvPicPr>
+            <a:picLocks noChangeAspect="1"/>
+          </p:cNvPicPr>
+          <p:nvPr/>
+        </p:nvPicPr>
+        <p:blipFill>
+          <a:blip r:embed="rId7"/>
+          <a:stretch>
+            <a:fillRect/>
+          </a:stretch>
+        </p:blipFill>
+        <p:spPr>
+          <a:xfrm>
+            <a:off x="4716369" y="6567265"/>
+            <a:ext cx="647369" cy="375474"/>
+          </a:xfrm>
+          <a:prstGeom prst="rect">
+            <a:avLst/>
+          </a:prstGeom>
+        </p:spPr>
+      </p:pic>
+      <p:sp>
+        <p:nvSpPr>
+          <p:cNvPr id="111" name="テキスト ボックス 110"/>
+          <p:cNvSpPr txBox="1"/>
+          <p:nvPr/>
+        </p:nvSpPr>
+        <p:spPr>
+          <a:xfrm>
+            <a:off x="5857529" y="6338789"/>
+            <a:ext cx="649567" cy="369332"/>
+          </a:xfrm>
+          <a:prstGeom prst="rect">
+            <a:avLst/>
+          </a:prstGeom>
+          <a:noFill/>
+        </p:spPr>
+        <p:txBody>
+          <a:bodyPr wrap="square" rtlCol="0">
+            <a:spAutoFit/>
+          </a:bodyPr>
+          <a:lstStyle/>
+          <a:p>
+            <a:r>
+              <a:rPr lang="en-US" altLang="ja-JP" smtClean="0">
+                <a:solidFill>
+                  <a:schemeClr val="bg1">
+                    <a:lumMod val="50000"/>
+                  </a:schemeClr>
+                </a:solidFill>
+              </a:rPr>
+              <a:t>OR</a:t>
+            </a:r>
+            <a:endParaRPr kumimoji="1" lang="ja-JP" altLang="en-US" dirty="0">
+              <a:solidFill>
+                <a:schemeClr val="bg1">
+                  <a:lumMod val="50000"/>
                 </a:schemeClr>
               </a:solidFill>
             </a:endParaRPr>

</xml_diff>

<commit_message>
Support trackingId and username
</commit_message>
<xml_diff>
--- a/images.pptx
+++ b/images.pptx
@@ -197,7 +197,7 @@
           <a:p>
             <a:fld id="{BC451F63-61CF-B94D-955A-F098561CC757}" type="datetimeFigureOut">
               <a:rPr kumimoji="1" lang="ja-JP" altLang="en-US" smtClean="0"/>
-              <a:t>2016/3/6</a:t>
+              <a:t>2016/3/20</a:t>
             </a:fld>
             <a:endParaRPr kumimoji="1" lang="ja-JP" altLang="en-US"/>
           </a:p>
@@ -712,7 +712,7 @@
           <a:p>
             <a:fld id="{D2D8EA25-67A6-EA48-A0F9-B2976239D8A5}" type="datetimeFigureOut">
               <a:rPr kumimoji="1" lang="ja-JP" altLang="en-US" smtClean="0"/>
-              <a:t>2016/3/6</a:t>
+              <a:t>2016/3/20</a:t>
             </a:fld>
             <a:endParaRPr kumimoji="1" lang="ja-JP" altLang="en-US"/>
           </a:p>
@@ -914,7 +914,7 @@
           <a:p>
             <a:fld id="{D2D8EA25-67A6-EA48-A0F9-B2976239D8A5}" type="datetimeFigureOut">
               <a:rPr kumimoji="1" lang="ja-JP" altLang="en-US" smtClean="0"/>
-              <a:t>2016/3/6</a:t>
+              <a:t>2016/3/20</a:t>
             </a:fld>
             <a:endParaRPr kumimoji="1" lang="ja-JP" altLang="en-US"/>
           </a:p>
@@ -1126,7 +1126,7 @@
           <a:p>
             <a:fld id="{D2D8EA25-67A6-EA48-A0F9-B2976239D8A5}" type="datetimeFigureOut">
               <a:rPr kumimoji="1" lang="ja-JP" altLang="en-US" smtClean="0"/>
-              <a:t>2016/3/6</a:t>
+              <a:t>2016/3/20</a:t>
             </a:fld>
             <a:endParaRPr kumimoji="1" lang="ja-JP" altLang="en-US"/>
           </a:p>
@@ -1328,7 +1328,7 @@
           <a:p>
             <a:fld id="{D2D8EA25-67A6-EA48-A0F9-B2976239D8A5}" type="datetimeFigureOut">
               <a:rPr kumimoji="1" lang="ja-JP" altLang="en-US" smtClean="0"/>
-              <a:t>2016/3/6</a:t>
+              <a:t>2016/3/20</a:t>
             </a:fld>
             <a:endParaRPr kumimoji="1" lang="ja-JP" altLang="en-US"/>
           </a:p>
@@ -1574,7 +1574,7 @@
           <a:p>
             <a:fld id="{D2D8EA25-67A6-EA48-A0F9-B2976239D8A5}" type="datetimeFigureOut">
               <a:rPr kumimoji="1" lang="ja-JP" altLang="en-US" smtClean="0"/>
-              <a:t>2016/3/6</a:t>
+              <a:t>2016/3/20</a:t>
             </a:fld>
             <a:endParaRPr kumimoji="1" lang="ja-JP" altLang="en-US"/>
           </a:p>
@@ -1870,7 +1870,7 @@
           <a:p>
             <a:fld id="{D2D8EA25-67A6-EA48-A0F9-B2976239D8A5}" type="datetimeFigureOut">
               <a:rPr kumimoji="1" lang="ja-JP" altLang="en-US" smtClean="0"/>
-              <a:t>2016/3/6</a:t>
+              <a:t>2016/3/20</a:t>
             </a:fld>
             <a:endParaRPr kumimoji="1" lang="ja-JP" altLang="en-US"/>
           </a:p>
@@ -2301,7 +2301,7 @@
           <a:p>
             <a:fld id="{D2D8EA25-67A6-EA48-A0F9-B2976239D8A5}" type="datetimeFigureOut">
               <a:rPr kumimoji="1" lang="ja-JP" altLang="en-US" smtClean="0"/>
-              <a:t>2016/3/6</a:t>
+              <a:t>2016/3/20</a:t>
             </a:fld>
             <a:endParaRPr kumimoji="1" lang="ja-JP" altLang="en-US"/>
           </a:p>
@@ -2419,7 +2419,7 @@
           <a:p>
             <a:fld id="{D2D8EA25-67A6-EA48-A0F9-B2976239D8A5}" type="datetimeFigureOut">
               <a:rPr kumimoji="1" lang="ja-JP" altLang="en-US" smtClean="0"/>
-              <a:t>2016/3/6</a:t>
+              <a:t>2016/3/20</a:t>
             </a:fld>
             <a:endParaRPr kumimoji="1" lang="ja-JP" altLang="en-US"/>
           </a:p>
@@ -2514,7 +2514,7 @@
           <a:p>
             <a:fld id="{D2D8EA25-67A6-EA48-A0F9-B2976239D8A5}" type="datetimeFigureOut">
               <a:rPr kumimoji="1" lang="ja-JP" altLang="en-US" smtClean="0"/>
-              <a:t>2016/3/6</a:t>
+              <a:t>2016/3/20</a:t>
             </a:fld>
             <a:endParaRPr kumimoji="1" lang="ja-JP" altLang="en-US"/>
           </a:p>
@@ -2823,7 +2823,7 @@
           <a:p>
             <a:fld id="{D2D8EA25-67A6-EA48-A0F9-B2976239D8A5}" type="datetimeFigureOut">
               <a:rPr kumimoji="1" lang="ja-JP" altLang="en-US" smtClean="0"/>
-              <a:t>2016/3/6</a:t>
+              <a:t>2016/3/20</a:t>
             </a:fld>
             <a:endParaRPr kumimoji="1" lang="ja-JP" altLang="en-US"/>
           </a:p>
@@ -3076,7 +3076,7 @@
           <a:p>
             <a:fld id="{D2D8EA25-67A6-EA48-A0F9-B2976239D8A5}" type="datetimeFigureOut">
               <a:rPr kumimoji="1" lang="ja-JP" altLang="en-US" smtClean="0"/>
-              <a:t>2016/3/6</a:t>
+              <a:t>2016/3/20</a:t>
             </a:fld>
             <a:endParaRPr kumimoji="1" lang="ja-JP" altLang="en-US"/>
           </a:p>
@@ -3321,7 +3321,7 @@
           <a:p>
             <a:fld id="{D2D8EA25-67A6-EA48-A0F9-B2976239D8A5}" type="datetimeFigureOut">
               <a:rPr kumimoji="1" lang="ja-JP" altLang="en-US" smtClean="0"/>
-              <a:t>2016/3/6</a:t>
+              <a:t>2016/3/20</a:t>
             </a:fld>
             <a:endParaRPr kumimoji="1" lang="ja-JP" altLang="en-US"/>
           </a:p>
@@ -3728,14 +3728,14 @@
       </p:grpSpPr>
       <p:sp>
         <p:nvSpPr>
-          <p:cNvPr id="119" name="正方形/長方形 118"/>
+          <p:cNvPr id="124" name="正方形/長方形 123"/>
           <p:cNvSpPr/>
           <p:nvPr/>
         </p:nvSpPr>
         <p:spPr>
           <a:xfrm>
-            <a:off x="324461" y="5916571"/>
-            <a:ext cx="5508771" cy="1429609"/>
+            <a:off x="6703120" y="5400577"/>
+            <a:ext cx="5560804" cy="2096671"/>
           </a:xfrm>
           <a:prstGeom prst="rect">
             <a:avLst/>
@@ -3778,14 +3778,14 @@
       </p:sp>
       <p:sp>
         <p:nvSpPr>
-          <p:cNvPr id="115" name="正方形/長方形 114"/>
+          <p:cNvPr id="119" name="正方形/長方形 118"/>
           <p:cNvSpPr/>
           <p:nvPr/>
         </p:nvSpPr>
         <p:spPr>
           <a:xfrm>
-            <a:off x="6550720" y="5248177"/>
-            <a:ext cx="5560804" cy="2096671"/>
+            <a:off x="403120" y="5916571"/>
+            <a:ext cx="5430112" cy="1429609"/>
           </a:xfrm>
           <a:prstGeom prst="rect">
             <a:avLst/>
@@ -3828,14 +3828,14 @@
       </p:sp>
       <p:sp>
         <p:nvSpPr>
-          <p:cNvPr id="113" name="正方形/長方形 112"/>
+          <p:cNvPr id="115" name="正方形/長方形 114"/>
           <p:cNvSpPr/>
           <p:nvPr/>
         </p:nvSpPr>
         <p:spPr>
           <a:xfrm>
-            <a:off x="324461" y="741027"/>
-            <a:ext cx="11787063" cy="4689529"/>
+            <a:off x="11280219" y="2210080"/>
+            <a:ext cx="2864265" cy="5287168"/>
           </a:xfrm>
           <a:prstGeom prst="rect">
             <a:avLst/>
@@ -3878,6 +3878,56 @@
       </p:sp>
       <p:sp>
         <p:nvSpPr>
+          <p:cNvPr id="113" name="正方形/長方形 112"/>
+          <p:cNvSpPr/>
+          <p:nvPr/>
+        </p:nvSpPr>
+        <p:spPr>
+          <a:xfrm>
+            <a:off x="403119" y="651609"/>
+            <a:ext cx="12477492" cy="4778948"/>
+          </a:xfrm>
+          <a:prstGeom prst="rect">
+            <a:avLst/>
+          </a:prstGeom>
+          <a:solidFill>
+            <a:schemeClr val="accent4">
+              <a:lumMod val="20000"/>
+              <a:lumOff val="80000"/>
+            </a:schemeClr>
+          </a:solidFill>
+          <a:ln>
+            <a:noFill/>
+            <a:prstDash val="dash"/>
+          </a:ln>
+        </p:spPr>
+        <p:style>
+          <a:lnRef idx="2">
+            <a:schemeClr val="accent1">
+              <a:shade val="50000"/>
+            </a:schemeClr>
+          </a:lnRef>
+          <a:fillRef idx="1">
+            <a:schemeClr val="accent1"/>
+          </a:fillRef>
+          <a:effectRef idx="0">
+            <a:schemeClr val="accent1"/>
+          </a:effectRef>
+          <a:fontRef idx="minor">
+            <a:schemeClr val="lt1"/>
+          </a:fontRef>
+        </p:style>
+        <p:txBody>
+          <a:bodyPr rtlCol="0" anchor="ctr"/>
+          <a:lstStyle/>
+          <a:p>
+            <a:pPr algn="ctr"/>
+            <a:endParaRPr kumimoji="1" lang="ja-JP" altLang="en-US"/>
+          </a:p>
+        </p:txBody>
+      </p:sp>
+      <p:sp>
+        <p:nvSpPr>
           <p:cNvPr id="4" name="角丸四角形 3"/>
           <p:cNvSpPr/>
           <p:nvPr/>
@@ -4458,7 +4508,7 @@
         </p:nvSpPr>
         <p:spPr>
           <a:xfrm>
-            <a:off x="6811231" y="6067470"/>
+            <a:off x="7283181" y="6067470"/>
             <a:ext cx="3637920" cy="1096855"/>
           </a:xfrm>
           <a:prstGeom prst="can">
@@ -4599,8 +4649,8 @@
         </p:nvSpPr>
         <p:spPr>
           <a:xfrm>
-            <a:off x="198063" y="8380298"/>
-            <a:ext cx="11803502" cy="1016484"/>
+            <a:off x="198063" y="8645770"/>
+            <a:ext cx="12997474" cy="1016484"/>
           </a:xfrm>
           <a:prstGeom prst="rect">
             <a:avLst/>
@@ -5110,8 +5160,8 @@
         </p:nvSpPr>
         <p:spPr>
           <a:xfrm>
-            <a:off x="324461" y="-115318"/>
-            <a:ext cx="11787063" cy="524544"/>
+            <a:off x="324462" y="-479111"/>
+            <a:ext cx="13820022" cy="524544"/>
           </a:xfrm>
           <a:prstGeom prst="roundRect">
             <a:avLst/>
@@ -5153,8 +5203,8 @@
         </p:nvCxnSpPr>
         <p:spPr>
           <a:xfrm>
-            <a:off x="2918532" y="409226"/>
-            <a:ext cx="6247" cy="2327888"/>
+            <a:off x="2924779" y="45433"/>
+            <a:ext cx="0" cy="2691681"/>
           </a:xfrm>
           <a:prstGeom prst="straightConnector1">
             <a:avLst/>
@@ -5194,8 +5244,8 @@
         </p:nvCxnSpPr>
         <p:spPr>
           <a:xfrm>
-            <a:off x="4070368" y="409226"/>
-            <a:ext cx="13979" cy="3746454"/>
+            <a:off x="4069011" y="45433"/>
+            <a:ext cx="15336" cy="4110247"/>
           </a:xfrm>
           <a:prstGeom prst="straightConnector1">
             <a:avLst/>
@@ -5235,8 +5285,8 @@
         </p:nvCxnSpPr>
         <p:spPr>
           <a:xfrm>
-            <a:off x="6129140" y="409226"/>
-            <a:ext cx="0" cy="2338162"/>
+            <a:off x="6129140" y="45433"/>
+            <a:ext cx="0" cy="2701955"/>
           </a:xfrm>
           <a:prstGeom prst="straightConnector1">
             <a:avLst/>
@@ -5276,8 +5326,8 @@
         </p:nvCxnSpPr>
         <p:spPr>
           <a:xfrm>
-            <a:off x="8135809" y="409226"/>
-            <a:ext cx="0" cy="2327888"/>
+            <a:off x="8135809" y="45433"/>
+            <a:ext cx="0" cy="2691681"/>
           </a:xfrm>
           <a:prstGeom prst="straightConnector1">
             <a:avLst/>
@@ -5317,8 +5367,8 @@
         </p:nvCxnSpPr>
         <p:spPr>
           <a:xfrm>
-            <a:off x="10075685" y="409226"/>
-            <a:ext cx="17625" cy="2327888"/>
+            <a:off x="10075060" y="45433"/>
+            <a:ext cx="18250" cy="2691681"/>
           </a:xfrm>
           <a:prstGeom prst="straightConnector1">
             <a:avLst/>
@@ -5526,7 +5576,7 @@
         </p:nvSpPr>
         <p:spPr>
           <a:xfrm>
-            <a:off x="109831" y="9481086"/>
+            <a:off x="109831" y="9746558"/>
             <a:ext cx="3066377" cy="369332"/>
           </a:xfrm>
           <a:prstGeom prst="rect">
@@ -5576,7 +5626,7 @@
           </a:xfrm>
           <a:prstGeom prst="bentConnector3">
             <a:avLst>
-              <a:gd name="adj1" fmla="val 111446"/>
+              <a:gd name="adj1" fmla="val 118830"/>
             </a:avLst>
           </a:prstGeom>
           <a:ln w="38100">
@@ -5693,7 +5743,7 @@
         </p:nvSpPr>
         <p:spPr>
           <a:xfrm>
-            <a:off x="8326179" y="6024446"/>
+            <a:off x="8837457" y="6024446"/>
             <a:ext cx="825867" cy="369332"/>
           </a:xfrm>
           <a:prstGeom prst="rect">
@@ -5724,9 +5774,9 @@
           <p:nvPr/>
         </p:nvCxnSpPr>
         <p:spPr>
-          <a:xfrm flipH="1">
-            <a:off x="11179910" y="409226"/>
-            <a:ext cx="1" cy="3768428"/>
+          <a:xfrm>
+            <a:off x="11179910" y="45433"/>
+            <a:ext cx="0" cy="4132221"/>
           </a:xfrm>
           <a:prstGeom prst="straightConnector1">
             <a:avLst/>
@@ -5853,7 +5903,7 @@
         </p:nvSpPr>
         <p:spPr>
           <a:xfrm>
-            <a:off x="1281462" y="8619445"/>
+            <a:off x="1281462" y="8884917"/>
             <a:ext cx="1117436" cy="594722"/>
           </a:xfrm>
           <a:prstGeom prst="roundRect">
@@ -5908,7 +5958,7 @@
         </p:nvSpPr>
         <p:spPr>
           <a:xfrm>
-            <a:off x="2560538" y="8623052"/>
+            <a:off x="2560538" y="8888524"/>
             <a:ext cx="939885" cy="591116"/>
           </a:xfrm>
           <a:prstGeom prst="can">
@@ -5950,7 +6000,7 @@
         </p:nvSpPr>
         <p:spPr>
           <a:xfrm>
-            <a:off x="3730314" y="8619446"/>
+            <a:off x="3730314" y="8884918"/>
             <a:ext cx="811805" cy="594722"/>
           </a:xfrm>
           <a:prstGeom prst="rect">
@@ -5992,7 +6042,7 @@
         </p:nvCxnSpPr>
         <p:spPr>
           <a:xfrm>
-            <a:off x="8964527" y="9138587"/>
+            <a:off x="8964527" y="9404059"/>
             <a:ext cx="817620" cy="0"/>
           </a:xfrm>
           <a:prstGeom prst="straightConnector1">
@@ -6031,7 +6081,7 @@
         </p:nvSpPr>
         <p:spPr>
           <a:xfrm>
-            <a:off x="9046201" y="8645491"/>
+            <a:off x="9046201" y="8910963"/>
             <a:ext cx="671979" cy="461665"/>
           </a:xfrm>
           <a:prstGeom prst="rect">
@@ -6067,7 +6117,7 @@
         </p:nvCxnSpPr>
         <p:spPr>
           <a:xfrm>
-            <a:off x="10995820" y="9138223"/>
+            <a:off x="10995820" y="9403695"/>
             <a:ext cx="817620" cy="0"/>
           </a:xfrm>
           <a:prstGeom prst="straightConnector1">
@@ -6105,7 +6155,7 @@
         </p:nvSpPr>
         <p:spPr>
           <a:xfrm>
-            <a:off x="11054048" y="8770813"/>
+            <a:off x="11054048" y="9026453"/>
             <a:ext cx="569387" cy="276999"/>
           </a:xfrm>
           <a:prstGeom prst="rect">
@@ -6135,7 +6185,7 @@
         </p:nvCxnSpPr>
         <p:spPr>
           <a:xfrm>
-            <a:off x="9994011" y="9138323"/>
+            <a:off x="9994011" y="9403795"/>
             <a:ext cx="817620" cy="0"/>
           </a:xfrm>
           <a:prstGeom prst="straightConnector1">
@@ -6174,7 +6224,7 @@
         </p:nvSpPr>
         <p:spPr>
           <a:xfrm>
-            <a:off x="10075685" y="8656950"/>
+            <a:off x="10075685" y="8922422"/>
             <a:ext cx="692818" cy="461665"/>
           </a:xfrm>
           <a:prstGeom prst="rect">
@@ -6257,7 +6307,7 @@
         </p:nvSpPr>
         <p:spPr>
           <a:xfrm>
-            <a:off x="176408" y="8380135"/>
+            <a:off x="176408" y="8645607"/>
             <a:ext cx="1037463" cy="369332"/>
           </a:xfrm>
           <a:prstGeom prst="rect">
@@ -6291,64 +6341,18 @@
           </a:p>
         </p:txBody>
       </p:sp>
-      <p:sp>
-        <p:nvSpPr>
-          <p:cNvPr id="52" name="角丸四角形 51"/>
-          <p:cNvSpPr/>
-          <p:nvPr/>
-        </p:nvSpPr>
-        <p:spPr>
-          <a:xfrm>
-            <a:off x="1835287" y="1288972"/>
-            <a:ext cx="9750240" cy="478037"/>
-          </a:xfrm>
-          <a:prstGeom prst="roundRect">
-            <a:avLst/>
-          </a:prstGeom>
-          <a:solidFill>
-            <a:srgbClr val="182BA2"/>
-          </a:solidFill>
-        </p:spPr>
-        <p:style>
-          <a:lnRef idx="1">
-            <a:schemeClr val="accent1"/>
-          </a:lnRef>
-          <a:fillRef idx="1002">
-            <a:schemeClr val="dk2"/>
-          </a:fillRef>
-          <a:effectRef idx="1">
-            <a:schemeClr val="accent1"/>
-          </a:effectRef>
-          <a:fontRef idx="minor">
-            <a:schemeClr val="dk1"/>
-          </a:fontRef>
-        </p:style>
-        <p:txBody>
-          <a:bodyPr rtlCol="0" anchor="ctr"/>
-          <a:lstStyle/>
-          <a:p>
-            <a:pPr algn="ctr"/>
-            <a:r>
-              <a:rPr lang="en-US" altLang="ja-JP" b="1" dirty="0" smtClean="0">
-                <a:solidFill>
-                  <a:schemeClr val="bg1"/>
-                </a:solidFill>
-              </a:rPr>
-              <a:t>Apache</a:t>
-            </a:r>
-          </a:p>
-        </p:txBody>
-      </p:sp>
       <p:pic>
         <p:nvPicPr>
-          <p:cNvPr id="1026" name="Picture 2" descr="https://httpd.apache.org/docs/current/ja/images/feather.png"/>
+          <p:cNvPr id="1030" name="Picture 6" descr="omcat Home">
+            <a:hlinkClick r:id="rId3"/>
+          </p:cNvPr>
           <p:cNvPicPr>
             <a:picLocks noChangeAspect="1" noChangeArrowheads="1"/>
           </p:cNvPicPr>
           <p:nvPr/>
         </p:nvPicPr>
         <p:blipFill>
-          <a:blip r:embed="rId3">
+          <a:blip r:embed="rId4">
             <a:extLst>
               <a:ext uri="{28A0092B-C50C-407E-A947-70E740481C1C}">
                 <a14:useLocalDpi xmlns:a14="http://schemas.microsoft.com/office/drawing/2010/main" val="0"/>
@@ -6362,8 +6366,8 @@
         </p:blipFill>
         <p:spPr bwMode="auto">
           <a:xfrm>
-            <a:off x="7224470" y="1348972"/>
-            <a:ext cx="1208719" cy="341171"/>
+            <a:off x="2069195" y="4789609"/>
+            <a:ext cx="475335" cy="338999"/>
           </a:xfrm>
           <a:prstGeom prst="rect">
             <a:avLst/>
@@ -6382,9 +6386,265 @@
       </p:pic>
       <p:pic>
         <p:nvPicPr>
-          <p:cNvPr id="1030" name="Picture 6" descr="omcat Home">
-            <a:hlinkClick r:id="rId4"/>
+          <p:cNvPr id="62" name="Picture 6" descr="omcat Home">
+            <a:hlinkClick r:id="rId3"/>
           </p:cNvPr>
+          <p:cNvPicPr>
+            <a:picLocks noChangeAspect="1" noChangeArrowheads="1"/>
+          </p:cNvPicPr>
+          <p:nvPr/>
+        </p:nvPicPr>
+        <p:blipFill>
+          <a:blip r:embed="rId4">
+            <a:extLst>
+              <a:ext uri="{28A0092B-C50C-407E-A947-70E740481C1C}">
+                <a14:useLocalDpi xmlns:a14="http://schemas.microsoft.com/office/drawing/2010/main" val="0"/>
+              </a:ext>
+            </a:extLst>
+          </a:blip>
+          <a:srcRect/>
+          <a:stretch>
+            <a:fillRect/>
+          </a:stretch>
+        </p:blipFill>
+        <p:spPr bwMode="auto">
+          <a:xfrm>
+            <a:off x="4436862" y="4792135"/>
+            <a:ext cx="475335" cy="338999"/>
+          </a:xfrm>
+          <a:prstGeom prst="rect">
+            <a:avLst/>
+          </a:prstGeom>
+          <a:noFill/>
+          <a:extLst>
+            <a:ext uri="{909E8E84-426E-40DD-AFC4-6F175D3DCCD1}">
+              <a14:hiddenFill xmlns:a14="http://schemas.microsoft.com/office/drawing/2010/main">
+                <a:solidFill>
+                  <a:srgbClr val="FFFFFF"/>
+                </a:solidFill>
+              </a14:hiddenFill>
+            </a:ext>
+          </a:extLst>
+        </p:spPr>
+      </p:pic>
+      <p:pic>
+        <p:nvPicPr>
+          <p:cNvPr id="64" name="Picture 6" descr="omcat Home">
+            <a:hlinkClick r:id="rId3"/>
+          </p:cNvPr>
+          <p:cNvPicPr>
+            <a:picLocks noChangeAspect="1" noChangeArrowheads="1"/>
+          </p:cNvPicPr>
+          <p:nvPr/>
+        </p:nvPicPr>
+        <p:blipFill>
+          <a:blip r:embed="rId4">
+            <a:extLst>
+              <a:ext uri="{28A0092B-C50C-407E-A947-70E740481C1C}">
+                <a14:useLocalDpi xmlns:a14="http://schemas.microsoft.com/office/drawing/2010/main" val="0"/>
+              </a:ext>
+            </a:extLst>
+          </a:blip>
+          <a:srcRect/>
+          <a:stretch>
+            <a:fillRect/>
+          </a:stretch>
+        </p:blipFill>
+        <p:spPr bwMode="auto">
+          <a:xfrm>
+            <a:off x="3277160" y="3385587"/>
+            <a:ext cx="475335" cy="338999"/>
+          </a:xfrm>
+          <a:prstGeom prst="rect">
+            <a:avLst/>
+          </a:prstGeom>
+          <a:noFill/>
+          <a:extLst>
+            <a:ext uri="{909E8E84-426E-40DD-AFC4-6F175D3DCCD1}">
+              <a14:hiddenFill xmlns:a14="http://schemas.microsoft.com/office/drawing/2010/main">
+                <a:solidFill>
+                  <a:srgbClr val="FFFFFF"/>
+                </a:solidFill>
+              </a14:hiddenFill>
+            </a:ext>
+          </a:extLst>
+        </p:spPr>
+      </p:pic>
+      <p:pic>
+        <p:nvPicPr>
+          <p:cNvPr id="65" name="Picture 6" descr="omcat Home">
+            <a:hlinkClick r:id="rId3"/>
+          </p:cNvPr>
+          <p:cNvPicPr>
+            <a:picLocks noChangeAspect="1" noChangeArrowheads="1"/>
+          </p:cNvPicPr>
+          <p:nvPr/>
+        </p:nvPicPr>
+        <p:blipFill>
+          <a:blip r:embed="rId4">
+            <a:extLst>
+              <a:ext uri="{28A0092B-C50C-407E-A947-70E740481C1C}">
+                <a14:useLocalDpi xmlns:a14="http://schemas.microsoft.com/office/drawing/2010/main" val="0"/>
+              </a:ext>
+            </a:extLst>
+          </a:blip>
+          <a:srcRect/>
+          <a:stretch>
+            <a:fillRect/>
+          </a:stretch>
+        </p:blipFill>
+        <p:spPr bwMode="auto">
+          <a:xfrm>
+            <a:off x="6503220" y="3391358"/>
+            <a:ext cx="475335" cy="338999"/>
+          </a:xfrm>
+          <a:prstGeom prst="rect">
+            <a:avLst/>
+          </a:prstGeom>
+          <a:noFill/>
+          <a:extLst>
+            <a:ext uri="{909E8E84-426E-40DD-AFC4-6F175D3DCCD1}">
+              <a14:hiddenFill xmlns:a14="http://schemas.microsoft.com/office/drawing/2010/main">
+                <a:solidFill>
+                  <a:srgbClr val="FFFFFF"/>
+                </a:solidFill>
+              </a14:hiddenFill>
+            </a:ext>
+          </a:extLst>
+        </p:spPr>
+      </p:pic>
+      <p:pic>
+        <p:nvPicPr>
+          <p:cNvPr id="67" name="Picture 6" descr="omcat Home">
+            <a:hlinkClick r:id="rId3"/>
+          </p:cNvPr>
+          <p:cNvPicPr>
+            <a:picLocks noChangeAspect="1" noChangeArrowheads="1"/>
+          </p:cNvPicPr>
+          <p:nvPr/>
+        </p:nvPicPr>
+        <p:blipFill>
+          <a:blip r:embed="rId4">
+            <a:extLst>
+              <a:ext uri="{28A0092B-C50C-407E-A947-70E740481C1C}">
+                <a14:useLocalDpi xmlns:a14="http://schemas.microsoft.com/office/drawing/2010/main" val="0"/>
+              </a:ext>
+            </a:extLst>
+          </a:blip>
+          <a:srcRect/>
+          <a:stretch>
+            <a:fillRect/>
+          </a:stretch>
+        </p:blipFill>
+        <p:spPr bwMode="auto">
+          <a:xfrm>
+            <a:off x="8501446" y="3381845"/>
+            <a:ext cx="475335" cy="338999"/>
+          </a:xfrm>
+          <a:prstGeom prst="rect">
+            <a:avLst/>
+          </a:prstGeom>
+          <a:noFill/>
+          <a:extLst>
+            <a:ext uri="{909E8E84-426E-40DD-AFC4-6F175D3DCCD1}">
+              <a14:hiddenFill xmlns:a14="http://schemas.microsoft.com/office/drawing/2010/main">
+                <a:solidFill>
+                  <a:srgbClr val="FFFFFF"/>
+                </a:solidFill>
+              </a14:hiddenFill>
+            </a:ext>
+          </a:extLst>
+        </p:spPr>
+      </p:pic>
+      <p:pic>
+        <p:nvPicPr>
+          <p:cNvPr id="68" name="Picture 6" descr="omcat Home">
+            <a:hlinkClick r:id="rId3"/>
+          </p:cNvPr>
+          <p:cNvPicPr>
+            <a:picLocks noChangeAspect="1" noChangeArrowheads="1"/>
+          </p:cNvPicPr>
+          <p:nvPr/>
+        </p:nvPicPr>
+        <p:blipFill>
+          <a:blip r:embed="rId4">
+            <a:extLst>
+              <a:ext uri="{28A0092B-C50C-407E-A947-70E740481C1C}">
+                <a14:useLocalDpi xmlns:a14="http://schemas.microsoft.com/office/drawing/2010/main" val="0"/>
+              </a:ext>
+            </a:extLst>
+          </a:blip>
+          <a:srcRect/>
+          <a:stretch>
+            <a:fillRect/>
+          </a:stretch>
+        </p:blipFill>
+        <p:spPr bwMode="auto">
+          <a:xfrm>
+            <a:off x="10449098" y="3393568"/>
+            <a:ext cx="475335" cy="338999"/>
+          </a:xfrm>
+          <a:prstGeom prst="rect">
+            <a:avLst/>
+          </a:prstGeom>
+          <a:noFill/>
+          <a:extLst>
+            <a:ext uri="{909E8E84-426E-40DD-AFC4-6F175D3DCCD1}">
+              <a14:hiddenFill xmlns:a14="http://schemas.microsoft.com/office/drawing/2010/main">
+                <a:solidFill>
+                  <a:srgbClr val="FFFFFF"/>
+                </a:solidFill>
+              </a14:hiddenFill>
+            </a:ext>
+          </a:extLst>
+        </p:spPr>
+      </p:pic>
+      <p:pic>
+        <p:nvPicPr>
+          <p:cNvPr id="70" name="Picture 6" descr="omcat Home">
+            <a:hlinkClick r:id="rId3"/>
+          </p:cNvPr>
+          <p:cNvPicPr>
+            <a:picLocks noChangeAspect="1" noChangeArrowheads="1"/>
+          </p:cNvPicPr>
+          <p:nvPr/>
+        </p:nvPicPr>
+        <p:blipFill>
+          <a:blip r:embed="rId4">
+            <a:extLst>
+              <a:ext uri="{28A0092B-C50C-407E-A947-70E740481C1C}">
+                <a14:useLocalDpi xmlns:a14="http://schemas.microsoft.com/office/drawing/2010/main" val="0"/>
+              </a:ext>
+            </a:extLst>
+          </a:blip>
+          <a:srcRect/>
+          <a:stretch>
+            <a:fillRect/>
+          </a:stretch>
+        </p:blipFill>
+        <p:spPr bwMode="auto">
+          <a:xfrm>
+            <a:off x="11526230" y="4818767"/>
+            <a:ext cx="475335" cy="338999"/>
+          </a:xfrm>
+          <a:prstGeom prst="rect">
+            <a:avLst/>
+          </a:prstGeom>
+          <a:noFill/>
+          <a:extLst>
+            <a:ext uri="{909E8E84-426E-40DD-AFC4-6F175D3DCCD1}">
+              <a14:hiddenFill xmlns:a14="http://schemas.microsoft.com/office/drawing/2010/main">
+                <a:solidFill>
+                  <a:srgbClr val="FFFFFF"/>
+                </a:solidFill>
+              </a14:hiddenFill>
+            </a:ext>
+          </a:extLst>
+        </p:spPr>
+      </p:pic>
+      <p:pic>
+        <p:nvPicPr>
+          <p:cNvPr id="74" name="Picture 2" descr="https://httpd.apache.org/docs/current/ja/images/feather.png"/>
           <p:cNvPicPr>
             <a:picLocks noChangeAspect="1" noChangeArrowheads="1"/>
           </p:cNvPicPr>
@@ -6405,8 +6665,8 @@
         </p:blipFill>
         <p:spPr bwMode="auto">
           <a:xfrm>
-            <a:off x="2069195" y="4789609"/>
-            <a:ext cx="475335" cy="338999"/>
+            <a:off x="4798065" y="8996654"/>
+            <a:ext cx="777823" cy="219547"/>
           </a:xfrm>
           <a:prstGeom prst="rect">
             <a:avLst/>
@@ -6425,9 +6685,1568 @@
       </p:pic>
       <p:pic>
         <p:nvPicPr>
-          <p:cNvPr id="62" name="Picture 6" descr="omcat Home">
-            <a:hlinkClick r:id="rId4"/>
+          <p:cNvPr id="75" name="Picture 6" descr="omcat Home">
+            <a:hlinkClick r:id="rId3"/>
           </p:cNvPr>
+          <p:cNvPicPr>
+            <a:picLocks noChangeAspect="1" noChangeArrowheads="1"/>
+          </p:cNvPicPr>
+          <p:nvPr/>
+        </p:nvPicPr>
+        <p:blipFill>
+          <a:blip r:embed="rId4">
+            <a:extLst>
+              <a:ext uri="{28A0092B-C50C-407E-A947-70E740481C1C}">
+                <a14:useLocalDpi xmlns:a14="http://schemas.microsoft.com/office/drawing/2010/main" val="0"/>
+              </a:ext>
+            </a:extLst>
+          </a:blip>
+          <a:srcRect/>
+          <a:stretch>
+            <a:fillRect/>
+          </a:stretch>
+        </p:blipFill>
+        <p:spPr bwMode="auto">
+          <a:xfrm>
+            <a:off x="5919110" y="8901361"/>
+            <a:ext cx="475335" cy="338999"/>
+          </a:xfrm>
+          <a:prstGeom prst="rect">
+            <a:avLst/>
+          </a:prstGeom>
+          <a:noFill/>
+          <a:extLst>
+            <a:ext uri="{909E8E84-426E-40DD-AFC4-6F175D3DCCD1}">
+              <a14:hiddenFill xmlns:a14="http://schemas.microsoft.com/office/drawing/2010/main">
+                <a:solidFill>
+                  <a:srgbClr val="FFFFFF"/>
+                </a:solidFill>
+              </a14:hiddenFill>
+            </a:ext>
+          </a:extLst>
+        </p:spPr>
+      </p:pic>
+      <p:sp>
+        <p:nvSpPr>
+          <p:cNvPr id="76" name="テキスト ボックス 75"/>
+          <p:cNvSpPr txBox="1"/>
+          <p:nvPr/>
+        </p:nvSpPr>
+        <p:spPr>
+          <a:xfrm>
+            <a:off x="4702087" y="9247588"/>
+            <a:ext cx="970137" cy="276999"/>
+          </a:xfrm>
+          <a:prstGeom prst="rect">
+            <a:avLst/>
+          </a:prstGeom>
+          <a:noFill/>
+        </p:spPr>
+        <p:txBody>
+          <a:bodyPr wrap="none" rtlCol="0">
+            <a:spAutoFit/>
+          </a:bodyPr>
+          <a:lstStyle/>
+          <a:p>
+            <a:r>
+              <a:rPr lang="en-US" altLang="ja-JP" sz="1200" dirty="0" smtClean="0"/>
+              <a:t>Apache 2.2</a:t>
+            </a:r>
+            <a:endParaRPr kumimoji="1" lang="ja-JP" altLang="en-US" sz="1200" dirty="0"/>
+          </a:p>
+        </p:txBody>
+      </p:sp>
+      <p:sp>
+        <p:nvSpPr>
+          <p:cNvPr id="77" name="テキスト ボックス 76"/>
+          <p:cNvSpPr txBox="1"/>
+          <p:nvPr/>
+        </p:nvSpPr>
+        <p:spPr>
+          <a:xfrm>
+            <a:off x="5682666" y="9251945"/>
+            <a:ext cx="974947" cy="276999"/>
+          </a:xfrm>
+          <a:prstGeom prst="rect">
+            <a:avLst/>
+          </a:prstGeom>
+          <a:noFill/>
+        </p:spPr>
+        <p:txBody>
+          <a:bodyPr wrap="none" rtlCol="0">
+            <a:spAutoFit/>
+          </a:bodyPr>
+          <a:lstStyle/>
+          <a:p>
+            <a:r>
+              <a:rPr lang="en-US" altLang="ja-JP" sz="1200" smtClean="0"/>
+              <a:t>Tomcat 8.0</a:t>
+            </a:r>
+            <a:endParaRPr kumimoji="1" lang="ja-JP" altLang="en-US" sz="1200" dirty="0"/>
+          </a:p>
+        </p:txBody>
+      </p:sp>
+      <p:pic>
+        <p:nvPicPr>
+          <p:cNvPr id="1033" name="Picture 9" descr="2 database logo"/>
+          <p:cNvPicPr>
+            <a:picLocks noChangeAspect="1" noChangeArrowheads="1"/>
+          </p:cNvPicPr>
+          <p:nvPr/>
+        </p:nvPicPr>
+        <p:blipFill>
+          <a:blip r:embed="rId6">
+            <a:extLst>
+              <a:ext uri="{28A0092B-C50C-407E-A947-70E740481C1C}">
+                <a14:useLocalDpi xmlns:a14="http://schemas.microsoft.com/office/drawing/2010/main" val="0"/>
+              </a:ext>
+            </a:extLst>
+          </a:blip>
+          <a:srcRect/>
+          <a:stretch>
+            <a:fillRect/>
+          </a:stretch>
+        </p:blipFill>
+        <p:spPr bwMode="auto">
+          <a:xfrm>
+            <a:off x="10198929" y="6694132"/>
+            <a:ext cx="661640" cy="360010"/>
+          </a:xfrm>
+          <a:prstGeom prst="rect">
+            <a:avLst/>
+          </a:prstGeom>
+          <a:noFill/>
+          <a:extLst>
+            <a:ext uri="{909E8E84-426E-40DD-AFC4-6F175D3DCCD1}">
+              <a14:hiddenFill xmlns:a14="http://schemas.microsoft.com/office/drawing/2010/main">
+                <a:solidFill>
+                  <a:srgbClr val="FFFFFF"/>
+                </a:solidFill>
+              </a14:hiddenFill>
+            </a:ext>
+          </a:extLst>
+        </p:spPr>
+      </p:pic>
+      <p:pic>
+        <p:nvPicPr>
+          <p:cNvPr id="78" name="Picture 9" descr="2 database logo"/>
+          <p:cNvPicPr>
+            <a:picLocks noChangeAspect="1" noChangeArrowheads="1"/>
+          </p:cNvPicPr>
+          <p:nvPr/>
+        </p:nvPicPr>
+        <p:blipFill>
+          <a:blip r:embed="rId6">
+            <a:extLst>
+              <a:ext uri="{28A0092B-C50C-407E-A947-70E740481C1C}">
+                <a14:useLocalDpi xmlns:a14="http://schemas.microsoft.com/office/drawing/2010/main" val="0"/>
+              </a:ext>
+            </a:extLst>
+          </a:blip>
+          <a:srcRect/>
+          <a:stretch>
+            <a:fillRect/>
+          </a:stretch>
+        </p:blipFill>
+        <p:spPr bwMode="auto">
+          <a:xfrm>
+            <a:off x="8048591" y="8881295"/>
+            <a:ext cx="657855" cy="357950"/>
+          </a:xfrm>
+          <a:prstGeom prst="rect">
+            <a:avLst/>
+          </a:prstGeom>
+          <a:noFill/>
+          <a:extLst>
+            <a:ext uri="{909E8E84-426E-40DD-AFC4-6F175D3DCCD1}">
+              <a14:hiddenFill xmlns:a14="http://schemas.microsoft.com/office/drawing/2010/main">
+                <a:solidFill>
+                  <a:srgbClr val="FFFFFF"/>
+                </a:solidFill>
+              </a14:hiddenFill>
+            </a:ext>
+          </a:extLst>
+        </p:spPr>
+      </p:pic>
+      <p:sp>
+        <p:nvSpPr>
+          <p:cNvPr id="79" name="テキスト ボックス 78"/>
+          <p:cNvSpPr txBox="1"/>
+          <p:nvPr/>
+        </p:nvSpPr>
+        <p:spPr>
+          <a:xfrm>
+            <a:off x="8067893" y="9247589"/>
+            <a:ext cx="638315" cy="276999"/>
+          </a:xfrm>
+          <a:prstGeom prst="rect">
+            <a:avLst/>
+          </a:prstGeom>
+          <a:noFill/>
+        </p:spPr>
+        <p:txBody>
+          <a:bodyPr wrap="none" rtlCol="0">
+            <a:spAutoFit/>
+          </a:bodyPr>
+          <a:lstStyle/>
+          <a:p>
+            <a:pPr algn="ctr"/>
+            <a:r>
+              <a:rPr lang="en-US" altLang="ja-JP" sz="1200" dirty="0" smtClean="0"/>
+              <a:t>H2 1.4</a:t>
+            </a:r>
+            <a:endParaRPr kumimoji="1" lang="ja-JP" altLang="en-US" sz="1200" dirty="0"/>
+          </a:p>
+        </p:txBody>
+      </p:sp>
+      <p:sp>
+        <p:nvSpPr>
+          <p:cNvPr id="80" name="テキスト ボックス 79"/>
+          <p:cNvSpPr txBox="1"/>
+          <p:nvPr/>
+        </p:nvSpPr>
+        <p:spPr>
+          <a:xfrm>
+            <a:off x="2078237" y="949243"/>
+            <a:ext cx="840295" cy="369332"/>
+          </a:xfrm>
+          <a:prstGeom prst="rect">
+            <a:avLst/>
+          </a:prstGeom>
+          <a:noFill/>
+        </p:spPr>
+        <p:txBody>
+          <a:bodyPr wrap="none" rtlCol="0">
+            <a:spAutoFit/>
+          </a:bodyPr>
+          <a:lstStyle/>
+          <a:p>
+            <a:r>
+              <a:rPr lang="en-US" altLang="ja-JP" dirty="0" smtClean="0"/>
+              <a:t>/</a:t>
+            </a:r>
+            <a:r>
+              <a:rPr lang="en-US" altLang="ja-JP" dirty="0" err="1" smtClean="0"/>
+              <a:t>api</a:t>
+            </a:r>
+            <a:r>
+              <a:rPr lang="en-US" altLang="ja-JP" dirty="0" smtClean="0"/>
+              <a:t>-c</a:t>
+            </a:r>
+            <a:endParaRPr kumimoji="1" lang="ja-JP" altLang="en-US" dirty="0"/>
+          </a:p>
+        </p:txBody>
+      </p:sp>
+      <p:sp>
+        <p:nvSpPr>
+          <p:cNvPr id="81" name="テキスト ボックス 80"/>
+          <p:cNvSpPr txBox="1"/>
+          <p:nvPr/>
+        </p:nvSpPr>
+        <p:spPr>
+          <a:xfrm>
+            <a:off x="3220455" y="940298"/>
+            <a:ext cx="849913" cy="369332"/>
+          </a:xfrm>
+          <a:prstGeom prst="rect">
+            <a:avLst/>
+          </a:prstGeom>
+          <a:noFill/>
+        </p:spPr>
+        <p:txBody>
+          <a:bodyPr wrap="none" rtlCol="0">
+            <a:spAutoFit/>
+          </a:bodyPr>
+          <a:lstStyle/>
+          <a:p>
+            <a:r>
+              <a:rPr lang="en-US" altLang="ja-JP" dirty="0" smtClean="0"/>
+              <a:t>/</a:t>
+            </a:r>
+            <a:r>
+              <a:rPr lang="en-US" altLang="ja-JP" dirty="0" err="1" smtClean="0"/>
+              <a:t>api</a:t>
+            </a:r>
+            <a:r>
+              <a:rPr lang="en-US" altLang="ja-JP" dirty="0" smtClean="0"/>
+              <a:t>-a</a:t>
+            </a:r>
+            <a:endParaRPr kumimoji="1" lang="ja-JP" altLang="en-US" dirty="0"/>
+          </a:p>
+        </p:txBody>
+      </p:sp>
+      <p:sp>
+        <p:nvSpPr>
+          <p:cNvPr id="82" name="テキスト ボックス 81"/>
+          <p:cNvSpPr txBox="1"/>
+          <p:nvPr/>
+        </p:nvSpPr>
+        <p:spPr>
+          <a:xfrm>
+            <a:off x="5344696" y="956295"/>
+            <a:ext cx="798617" cy="369332"/>
+          </a:xfrm>
+          <a:prstGeom prst="rect">
+            <a:avLst/>
+          </a:prstGeom>
+          <a:noFill/>
+        </p:spPr>
+        <p:txBody>
+          <a:bodyPr wrap="none" rtlCol="0">
+            <a:spAutoFit/>
+          </a:bodyPr>
+          <a:lstStyle/>
+          <a:p>
+            <a:r>
+              <a:rPr lang="en-US" altLang="ja-JP" dirty="0" smtClean="0"/>
+              <a:t>/</a:t>
+            </a:r>
+            <a:r>
+              <a:rPr lang="en-US" altLang="ja-JP" dirty="0" err="1" smtClean="0"/>
+              <a:t>scr</a:t>
+            </a:r>
+            <a:r>
+              <a:rPr lang="en-US" altLang="ja-JP" dirty="0" smtClean="0"/>
+              <a:t>-t</a:t>
+            </a:r>
+            <a:endParaRPr kumimoji="1" lang="ja-JP" altLang="en-US" dirty="0"/>
+          </a:p>
+        </p:txBody>
+      </p:sp>
+      <p:sp>
+        <p:nvSpPr>
+          <p:cNvPr id="83" name="テキスト ボックス 82"/>
+          <p:cNvSpPr txBox="1"/>
+          <p:nvPr/>
+        </p:nvSpPr>
+        <p:spPr>
+          <a:xfrm>
+            <a:off x="7370684" y="963531"/>
+            <a:ext cx="798617" cy="369332"/>
+          </a:xfrm>
+          <a:prstGeom prst="rect">
+            <a:avLst/>
+          </a:prstGeom>
+          <a:noFill/>
+        </p:spPr>
+        <p:txBody>
+          <a:bodyPr wrap="none" rtlCol="0">
+            <a:spAutoFit/>
+          </a:bodyPr>
+          <a:lstStyle/>
+          <a:p>
+            <a:r>
+              <a:rPr lang="en-US" altLang="ja-JP" dirty="0" smtClean="0"/>
+              <a:t>/</a:t>
+            </a:r>
+            <a:r>
+              <a:rPr lang="en-US" altLang="ja-JP" dirty="0" err="1" smtClean="0"/>
+              <a:t>scr</a:t>
+            </a:r>
+            <a:r>
+              <a:rPr lang="en-US" altLang="ja-JP" dirty="0" smtClean="0"/>
+              <a:t>-f</a:t>
+            </a:r>
+            <a:endParaRPr kumimoji="1" lang="ja-JP" altLang="en-US" dirty="0"/>
+          </a:p>
+        </p:txBody>
+      </p:sp>
+      <p:sp>
+        <p:nvSpPr>
+          <p:cNvPr id="84" name="テキスト ボックス 83"/>
+          <p:cNvSpPr txBox="1"/>
+          <p:nvPr/>
+        </p:nvSpPr>
+        <p:spPr>
+          <a:xfrm>
+            <a:off x="9325433" y="950804"/>
+            <a:ext cx="798617" cy="369332"/>
+          </a:xfrm>
+          <a:prstGeom prst="rect">
+            <a:avLst/>
+          </a:prstGeom>
+          <a:noFill/>
+        </p:spPr>
+        <p:txBody>
+          <a:bodyPr wrap="none" rtlCol="0">
+            <a:spAutoFit/>
+          </a:bodyPr>
+          <a:lstStyle/>
+          <a:p>
+            <a:r>
+              <a:rPr lang="en-US" altLang="ja-JP" dirty="0" smtClean="0"/>
+              <a:t>/</a:t>
+            </a:r>
+            <a:r>
+              <a:rPr lang="en-US" altLang="ja-JP" dirty="0" err="1" smtClean="0"/>
+              <a:t>scr</a:t>
+            </a:r>
+            <a:r>
+              <a:rPr lang="en-US" altLang="ja-JP" dirty="0" smtClean="0"/>
+              <a:t>-j</a:t>
+            </a:r>
+            <a:endParaRPr kumimoji="1" lang="ja-JP" altLang="en-US" dirty="0"/>
+          </a:p>
+        </p:txBody>
+      </p:sp>
+      <p:sp>
+        <p:nvSpPr>
+          <p:cNvPr id="85" name="テキスト ボックス 84"/>
+          <p:cNvSpPr txBox="1"/>
+          <p:nvPr/>
+        </p:nvSpPr>
+        <p:spPr>
+          <a:xfrm>
+            <a:off x="10647436" y="950130"/>
+            <a:ext cx="564578" cy="369332"/>
+          </a:xfrm>
+          <a:prstGeom prst="rect">
+            <a:avLst/>
+          </a:prstGeom>
+          <a:noFill/>
+        </p:spPr>
+        <p:txBody>
+          <a:bodyPr wrap="none" rtlCol="0">
+            <a:spAutoFit/>
+          </a:bodyPr>
+          <a:lstStyle/>
+          <a:p>
+            <a:r>
+              <a:rPr lang="en-US" altLang="ja-JP" dirty="0" smtClean="0"/>
+              <a:t>/</a:t>
+            </a:r>
+            <a:r>
+              <a:rPr lang="en-US" altLang="ja-JP" dirty="0" err="1" smtClean="0"/>
+              <a:t>db</a:t>
+            </a:r>
+            <a:endParaRPr kumimoji="1" lang="ja-JP" altLang="en-US" dirty="0"/>
+          </a:p>
+        </p:txBody>
+      </p:sp>
+      <p:sp>
+        <p:nvSpPr>
+          <p:cNvPr id="93" name="正方形/長方形 92"/>
+          <p:cNvSpPr/>
+          <p:nvPr/>
+        </p:nvSpPr>
+        <p:spPr>
+          <a:xfrm>
+            <a:off x="1699718" y="855398"/>
+            <a:ext cx="11072367" cy="1055385"/>
+          </a:xfrm>
+          <a:prstGeom prst="rect">
+            <a:avLst/>
+          </a:prstGeom>
+          <a:noFill/>
+          <a:ln>
+            <a:solidFill>
+              <a:schemeClr val="bg1">
+                <a:lumMod val="65000"/>
+              </a:schemeClr>
+            </a:solidFill>
+            <a:prstDash val="dash"/>
+          </a:ln>
+        </p:spPr>
+        <p:style>
+          <a:lnRef idx="2">
+            <a:schemeClr val="accent1">
+              <a:shade val="50000"/>
+            </a:schemeClr>
+          </a:lnRef>
+          <a:fillRef idx="1">
+            <a:schemeClr val="accent1"/>
+          </a:fillRef>
+          <a:effectRef idx="0">
+            <a:schemeClr val="accent1"/>
+          </a:effectRef>
+          <a:fontRef idx="minor">
+            <a:schemeClr val="lt1"/>
+          </a:fontRef>
+        </p:style>
+        <p:txBody>
+          <a:bodyPr rtlCol="0" anchor="ctr"/>
+          <a:lstStyle/>
+          <a:p>
+            <a:pPr algn="ctr"/>
+            <a:endParaRPr kumimoji="1" lang="ja-JP" altLang="en-US"/>
+          </a:p>
+        </p:txBody>
+      </p:sp>
+      <p:sp>
+        <p:nvSpPr>
+          <p:cNvPr id="86" name="正方形/長方形 85"/>
+          <p:cNvSpPr/>
+          <p:nvPr/>
+        </p:nvSpPr>
+        <p:spPr>
+          <a:xfrm>
+            <a:off x="198063" y="5728629"/>
+            <a:ext cx="11531820" cy="2483934"/>
+          </a:xfrm>
+          <a:prstGeom prst="rect">
+            <a:avLst/>
+          </a:prstGeom>
+          <a:noFill/>
+          <a:ln w="28575">
+            <a:solidFill>
+              <a:schemeClr val="tx1">
+                <a:lumMod val="65000"/>
+                <a:lumOff val="35000"/>
+              </a:schemeClr>
+            </a:solidFill>
+            <a:prstDash val="dash"/>
+          </a:ln>
+        </p:spPr>
+        <p:style>
+          <a:lnRef idx="2">
+            <a:schemeClr val="accent1">
+              <a:shade val="50000"/>
+            </a:schemeClr>
+          </a:lnRef>
+          <a:fillRef idx="1">
+            <a:schemeClr val="accent1"/>
+          </a:fillRef>
+          <a:effectRef idx="0">
+            <a:schemeClr val="accent1"/>
+          </a:effectRef>
+          <a:fontRef idx="minor">
+            <a:schemeClr val="lt1"/>
+          </a:fontRef>
+        </p:style>
+        <p:txBody>
+          <a:bodyPr rtlCol="0" anchor="ctr"/>
+          <a:lstStyle/>
+          <a:p>
+            <a:pPr algn="ctr"/>
+            <a:endParaRPr kumimoji="1" lang="ja-JP" altLang="en-US"/>
+          </a:p>
+        </p:txBody>
+      </p:sp>
+      <p:sp>
+        <p:nvSpPr>
+          <p:cNvPr id="90" name="円柱 89"/>
+          <p:cNvSpPr/>
+          <p:nvPr/>
+        </p:nvSpPr>
+        <p:spPr>
+          <a:xfrm>
+            <a:off x="1697638" y="6092536"/>
+            <a:ext cx="3637920" cy="1096855"/>
+          </a:xfrm>
+          <a:prstGeom prst="can">
+            <a:avLst/>
+          </a:prstGeom>
+        </p:spPr>
+        <p:style>
+          <a:lnRef idx="1">
+            <a:schemeClr val="accent3"/>
+          </a:lnRef>
+          <a:fillRef idx="2">
+            <a:schemeClr val="accent3"/>
+          </a:fillRef>
+          <a:effectRef idx="1">
+            <a:schemeClr val="accent3"/>
+          </a:effectRef>
+          <a:fontRef idx="minor">
+            <a:schemeClr val="dk1"/>
+          </a:fontRef>
+        </p:style>
+        <p:txBody>
+          <a:bodyPr rtlCol="0" anchor="ctr"/>
+          <a:lstStyle/>
+          <a:p>
+            <a:pPr algn="ctr"/>
+            <a:r>
+              <a:rPr lang="en-US" altLang="ja-JP" dirty="0" smtClean="0"/>
+              <a:t>PostgreSQL</a:t>
+            </a:r>
+          </a:p>
+        </p:txBody>
+      </p:sp>
+      <p:sp>
+        <p:nvSpPr>
+          <p:cNvPr id="91" name="テキスト ボックス 90"/>
+          <p:cNvSpPr txBox="1"/>
+          <p:nvPr/>
+        </p:nvSpPr>
+        <p:spPr>
+          <a:xfrm>
+            <a:off x="3314263" y="6051098"/>
+            <a:ext cx="697627" cy="369332"/>
+          </a:xfrm>
+          <a:prstGeom prst="rect">
+            <a:avLst/>
+          </a:prstGeom>
+          <a:noFill/>
+        </p:spPr>
+        <p:txBody>
+          <a:bodyPr wrap="none" rtlCol="0">
+            <a:spAutoFit/>
+          </a:bodyPr>
+          <a:lstStyle/>
+          <a:p>
+            <a:r>
+              <a:rPr kumimoji="1" lang="en-US" altLang="ja-JP" smtClean="0"/>
+              <a:t>5432</a:t>
+            </a:r>
+            <a:endParaRPr kumimoji="1" lang="ja-JP" altLang="en-US" dirty="0"/>
+          </a:p>
+        </p:txBody>
+      </p:sp>
+      <p:cxnSp>
+        <p:nvCxnSpPr>
+          <p:cNvPr id="99" name="直線矢印コネクタ 98"/>
+          <p:cNvCxnSpPr>
+            <a:stCxn id="36" idx="2"/>
+            <a:endCxn id="11" idx="4"/>
+          </p:cNvCxnSpPr>
+          <p:nvPr/>
+        </p:nvCxnSpPr>
+        <p:spPr>
+          <a:xfrm rot="5400000">
+            <a:off x="10288584" y="5724572"/>
+            <a:ext cx="1523844" cy="258809"/>
+          </a:xfrm>
+          <a:prstGeom prst="bentConnector2">
+            <a:avLst/>
+          </a:prstGeom>
+          <a:ln w="38100">
+            <a:solidFill>
+              <a:schemeClr val="bg1">
+                <a:lumMod val="65000"/>
+              </a:schemeClr>
+            </a:solidFill>
+            <a:tailEnd type="triangle"/>
+          </a:ln>
+        </p:spPr>
+        <p:style>
+          <a:lnRef idx="1">
+            <a:schemeClr val="accent1"/>
+          </a:lnRef>
+          <a:fillRef idx="0">
+            <a:schemeClr val="accent1"/>
+          </a:fillRef>
+          <a:effectRef idx="0">
+            <a:schemeClr val="accent1"/>
+          </a:effectRef>
+          <a:fontRef idx="minor">
+            <a:schemeClr val="tx1"/>
+          </a:fontRef>
+        </p:style>
+      </p:cxnSp>
+      <p:pic>
+        <p:nvPicPr>
+          <p:cNvPr id="96" name="図 95"/>
+          <p:cNvPicPr>
+            <a:picLocks noChangeAspect="1"/>
+          </p:cNvPicPr>
+          <p:nvPr/>
+        </p:nvPicPr>
+        <p:blipFill>
+          <a:blip r:embed="rId7"/>
+          <a:stretch>
+            <a:fillRect/>
+          </a:stretch>
+        </p:blipFill>
+        <p:spPr>
+          <a:xfrm>
+            <a:off x="6974450" y="8881947"/>
+            <a:ext cx="647369" cy="375474"/>
+          </a:xfrm>
+          <a:prstGeom prst="rect">
+            <a:avLst/>
+          </a:prstGeom>
+        </p:spPr>
+      </p:pic>
+      <p:sp>
+        <p:nvSpPr>
+          <p:cNvPr id="109" name="テキスト ボックス 108"/>
+          <p:cNvSpPr txBox="1"/>
+          <p:nvPr/>
+        </p:nvSpPr>
+        <p:spPr>
+          <a:xfrm>
+            <a:off x="6688186" y="9245531"/>
+            <a:ext cx="1285929" cy="276999"/>
+          </a:xfrm>
+          <a:prstGeom prst="rect">
+            <a:avLst/>
+          </a:prstGeom>
+          <a:noFill/>
+        </p:spPr>
+        <p:txBody>
+          <a:bodyPr wrap="none" rtlCol="0">
+            <a:spAutoFit/>
+          </a:bodyPr>
+          <a:lstStyle/>
+          <a:p>
+            <a:pPr algn="ctr"/>
+            <a:r>
+              <a:rPr kumimoji="1" lang="en-US" altLang="ja-JP" sz="1200" dirty="0" smtClean="0"/>
+              <a:t>PostgreSQL 9.4</a:t>
+            </a:r>
+            <a:endParaRPr kumimoji="1" lang="ja-JP" altLang="en-US" sz="1200" dirty="0"/>
+          </a:p>
+        </p:txBody>
+      </p:sp>
+      <p:pic>
+        <p:nvPicPr>
+          <p:cNvPr id="110" name="図 109"/>
+          <p:cNvPicPr>
+            <a:picLocks noChangeAspect="1"/>
+          </p:cNvPicPr>
+          <p:nvPr/>
+        </p:nvPicPr>
+        <p:blipFill>
+          <a:blip r:embed="rId7"/>
+          <a:stretch>
+            <a:fillRect/>
+          </a:stretch>
+        </p:blipFill>
+        <p:spPr>
+          <a:xfrm>
+            <a:off x="4608215" y="6655753"/>
+            <a:ext cx="647369" cy="375474"/>
+          </a:xfrm>
+          <a:prstGeom prst="rect">
+            <a:avLst/>
+          </a:prstGeom>
+        </p:spPr>
+      </p:pic>
+      <p:sp>
+        <p:nvSpPr>
+          <p:cNvPr id="111" name="テキスト ボックス 110"/>
+          <p:cNvSpPr txBox="1"/>
+          <p:nvPr/>
+        </p:nvSpPr>
+        <p:spPr>
+          <a:xfrm>
+            <a:off x="5936186" y="6427277"/>
+            <a:ext cx="649567" cy="369332"/>
+          </a:xfrm>
+          <a:prstGeom prst="rect">
+            <a:avLst/>
+          </a:prstGeom>
+          <a:noFill/>
+        </p:spPr>
+        <p:txBody>
+          <a:bodyPr wrap="square" rtlCol="0">
+            <a:spAutoFit/>
+          </a:bodyPr>
+          <a:lstStyle/>
+          <a:p>
+            <a:r>
+              <a:rPr lang="en-US" altLang="ja-JP" smtClean="0">
+                <a:solidFill>
+                  <a:schemeClr val="bg1">
+                    <a:lumMod val="50000"/>
+                  </a:schemeClr>
+                </a:solidFill>
+              </a:rPr>
+              <a:t>OR</a:t>
+            </a:r>
+            <a:endParaRPr kumimoji="1" lang="ja-JP" altLang="en-US" dirty="0">
+              <a:solidFill>
+                <a:schemeClr val="bg1">
+                  <a:lumMod val="50000"/>
+                </a:schemeClr>
+              </a:solidFill>
+            </a:endParaRPr>
+          </a:p>
+        </p:txBody>
+      </p:sp>
+      <p:sp>
+        <p:nvSpPr>
+          <p:cNvPr id="92" name="角丸四角形 91"/>
+          <p:cNvSpPr/>
+          <p:nvPr/>
+        </p:nvSpPr>
+        <p:spPr>
+          <a:xfrm>
+            <a:off x="11756262" y="2789789"/>
+            <a:ext cx="1458936" cy="914400"/>
+          </a:xfrm>
+          <a:prstGeom prst="roundRect">
+            <a:avLst/>
+          </a:prstGeom>
+          <a:solidFill>
+            <a:schemeClr val="accent6"/>
+          </a:solidFill>
+          <a:ln>
+            <a:solidFill>
+              <a:schemeClr val="accent6">
+                <a:lumMod val="75000"/>
+              </a:schemeClr>
+            </a:solidFill>
+          </a:ln>
+        </p:spPr>
+        <p:style>
+          <a:lnRef idx="1">
+            <a:schemeClr val="accent1"/>
+          </a:lnRef>
+          <a:fillRef idx="2">
+            <a:schemeClr val="accent1"/>
+          </a:fillRef>
+          <a:effectRef idx="1">
+            <a:schemeClr val="accent1"/>
+          </a:effectRef>
+          <a:fontRef idx="minor">
+            <a:schemeClr val="dk1"/>
+          </a:fontRef>
+        </p:style>
+        <p:txBody>
+          <a:bodyPr rtlCol="0" anchor="ctr"/>
+          <a:lstStyle/>
+          <a:p>
+            <a:pPr algn="ctr"/>
+            <a:r>
+              <a:rPr lang="en-US" altLang="ja-JP" dirty="0" err="1" smtClean="0">
+                <a:solidFill>
+                  <a:schemeClr val="bg1"/>
+                </a:solidFill>
+              </a:rPr>
+              <a:t>jms</a:t>
+            </a:r>
+            <a:r>
+              <a:rPr lang="en-US" altLang="ja-JP" dirty="0" smtClean="0">
+                <a:solidFill>
+                  <a:schemeClr val="bg1"/>
+                </a:solidFill>
+              </a:rPr>
+              <a:t>-consumer</a:t>
+            </a:r>
+            <a:endParaRPr lang="en-US" altLang="ja-JP" dirty="0" smtClean="0">
+              <a:solidFill>
+                <a:schemeClr val="bg1"/>
+              </a:solidFill>
+            </a:endParaRPr>
+          </a:p>
+          <a:p>
+            <a:pPr algn="ctr"/>
+            <a:r>
+              <a:rPr lang="en-US" altLang="ja-JP" dirty="0" smtClean="0">
+                <a:solidFill>
+                  <a:schemeClr val="bg1"/>
+                </a:solidFill>
+              </a:rPr>
+              <a:t>(/</a:t>
+            </a:r>
+            <a:r>
+              <a:rPr lang="en-US" altLang="ja-JP" dirty="0" err="1" smtClean="0">
+                <a:solidFill>
+                  <a:schemeClr val="bg1"/>
+                </a:solidFill>
+              </a:rPr>
+              <a:t>jms</a:t>
+            </a:r>
+            <a:r>
+              <a:rPr lang="en-US" altLang="ja-JP" dirty="0" smtClean="0">
+                <a:solidFill>
+                  <a:schemeClr val="bg1"/>
+                </a:solidFill>
+              </a:rPr>
+              <a:t>-c)</a:t>
+            </a:r>
+            <a:endParaRPr lang="en-US" altLang="ja-JP" dirty="0" smtClean="0">
+              <a:solidFill>
+                <a:schemeClr val="bg1"/>
+              </a:solidFill>
+            </a:endParaRPr>
+          </a:p>
+        </p:txBody>
+      </p:sp>
+      <p:sp>
+        <p:nvSpPr>
+          <p:cNvPr id="94" name="正方形/長方形 93"/>
+          <p:cNvSpPr/>
+          <p:nvPr/>
+        </p:nvSpPr>
+        <p:spPr>
+          <a:xfrm>
+            <a:off x="13076888" y="651610"/>
+            <a:ext cx="1070190" cy="1339782"/>
+          </a:xfrm>
+          <a:prstGeom prst="rect">
+            <a:avLst/>
+          </a:prstGeom>
+          <a:solidFill>
+            <a:schemeClr val="accent4">
+              <a:lumMod val="20000"/>
+              <a:lumOff val="80000"/>
+            </a:schemeClr>
+          </a:solidFill>
+          <a:ln>
+            <a:noFill/>
+            <a:prstDash val="dash"/>
+          </a:ln>
+        </p:spPr>
+        <p:style>
+          <a:lnRef idx="2">
+            <a:schemeClr val="accent1">
+              <a:shade val="50000"/>
+            </a:schemeClr>
+          </a:lnRef>
+          <a:fillRef idx="1">
+            <a:schemeClr val="accent1"/>
+          </a:fillRef>
+          <a:effectRef idx="0">
+            <a:schemeClr val="accent1"/>
+          </a:effectRef>
+          <a:fontRef idx="minor">
+            <a:schemeClr val="lt1"/>
+          </a:fontRef>
+        </p:style>
+        <p:txBody>
+          <a:bodyPr rtlCol="0" anchor="ctr"/>
+          <a:lstStyle/>
+          <a:p>
+            <a:pPr algn="ctr"/>
+            <a:endParaRPr kumimoji="1" lang="ja-JP" altLang="en-US"/>
+          </a:p>
+        </p:txBody>
+      </p:sp>
+      <p:cxnSp>
+        <p:nvCxnSpPr>
+          <p:cNvPr id="95" name="直線矢印コネクタ 98"/>
+          <p:cNvCxnSpPr>
+            <a:stCxn id="92" idx="2"/>
+            <a:endCxn id="86" idx="3"/>
+          </p:cNvCxnSpPr>
+          <p:nvPr/>
+        </p:nvCxnSpPr>
+        <p:spPr>
+          <a:xfrm rot="5400000">
+            <a:off x="10474604" y="4959469"/>
+            <a:ext cx="3266407" cy="755847"/>
+          </a:xfrm>
+          <a:prstGeom prst="bentConnector2">
+            <a:avLst/>
+          </a:prstGeom>
+          <a:ln w="38100">
+            <a:solidFill>
+              <a:schemeClr val="bg1">
+                <a:lumMod val="65000"/>
+              </a:schemeClr>
+            </a:solidFill>
+            <a:tailEnd type="triangle"/>
+          </a:ln>
+        </p:spPr>
+        <p:style>
+          <a:lnRef idx="1">
+            <a:schemeClr val="accent1"/>
+          </a:lnRef>
+          <a:fillRef idx="0">
+            <a:schemeClr val="accent1"/>
+          </a:fillRef>
+          <a:effectRef idx="0">
+            <a:schemeClr val="accent1"/>
+          </a:effectRef>
+          <a:fontRef idx="minor">
+            <a:schemeClr val="tx1"/>
+          </a:fontRef>
+        </p:style>
+      </p:cxnSp>
+      <p:sp>
+        <p:nvSpPr>
+          <p:cNvPr id="98" name="テキスト ボックス 97"/>
+          <p:cNvSpPr txBox="1"/>
+          <p:nvPr/>
+        </p:nvSpPr>
+        <p:spPr>
+          <a:xfrm>
+            <a:off x="11535230" y="2460643"/>
+            <a:ext cx="825867" cy="369332"/>
+          </a:xfrm>
+          <a:prstGeom prst="rect">
+            <a:avLst/>
+          </a:prstGeom>
+          <a:noFill/>
+        </p:spPr>
+        <p:txBody>
+          <a:bodyPr wrap="none" rtlCol="0">
+            <a:spAutoFit/>
+          </a:bodyPr>
+          <a:lstStyle/>
+          <a:p>
+            <a:r>
+              <a:rPr kumimoji="1" lang="en-US" altLang="ja-JP" dirty="0" smtClean="0"/>
+              <a:t>20000</a:t>
+            </a:r>
+            <a:endParaRPr kumimoji="1" lang="ja-JP" altLang="en-US" dirty="0"/>
+          </a:p>
+        </p:txBody>
+      </p:sp>
+      <p:grpSp>
+        <p:nvGrpSpPr>
+          <p:cNvPr id="25" name="図形グループ 24"/>
+          <p:cNvGrpSpPr/>
+          <p:nvPr/>
+        </p:nvGrpSpPr>
+        <p:grpSpPr>
+          <a:xfrm>
+            <a:off x="411412" y="6143352"/>
+            <a:ext cx="894752" cy="797465"/>
+            <a:chOff x="-1341383" y="5624533"/>
+            <a:chExt cx="894752" cy="797465"/>
+          </a:xfrm>
+        </p:grpSpPr>
+        <p:pic>
+          <p:nvPicPr>
+            <p:cNvPr id="102" name="Picture 5"/>
+            <p:cNvPicPr>
+              <a:picLocks noChangeAspect="1"/>
+            </p:cNvPicPr>
+            <p:nvPr/>
+          </p:nvPicPr>
+          <p:blipFill>
+            <a:blip r:embed="rId8">
+              <a:extLst>
+                <a:ext uri="{28A0092B-C50C-407E-A947-70E740481C1C}">
+                  <a14:useLocalDpi xmlns:a14="http://schemas.microsoft.com/office/drawing/2010/main" val="0"/>
+                </a:ext>
+              </a:extLst>
+            </a:blip>
+            <a:stretch>
+              <a:fillRect/>
+            </a:stretch>
+          </p:blipFill>
+          <p:spPr>
+            <a:xfrm>
+              <a:off x="-1154690" y="5624533"/>
+              <a:ext cx="521366" cy="602830"/>
+            </a:xfrm>
+            <a:prstGeom prst="rect">
+              <a:avLst/>
+            </a:prstGeom>
+          </p:spPr>
+        </p:pic>
+        <p:sp>
+          <p:nvSpPr>
+            <p:cNvPr id="103" name="TextBox 397"/>
+            <p:cNvSpPr txBox="1"/>
+            <p:nvPr/>
+          </p:nvSpPr>
+          <p:spPr>
+            <a:xfrm>
+              <a:off x="-1341383" y="6266366"/>
+              <a:ext cx="894752" cy="155632"/>
+            </a:xfrm>
+            <a:prstGeom prst="rect">
+              <a:avLst/>
+            </a:prstGeom>
+            <a:noFill/>
+          </p:spPr>
+          <p:txBody>
+            <a:bodyPr wrap="square" lIns="0" tIns="0" rIns="0" bIns="0" rtlCol="0" anchor="t">
+              <a:noAutofit/>
+            </a:bodyPr>
+            <a:lstStyle/>
+            <a:p>
+              <a:pPr algn="ctr"/>
+              <a:r>
+                <a:rPr lang="en-US" sz="1000" b="1" dirty="0" smtClean="0"/>
+                <a:t>Amazon</a:t>
+              </a:r>
+              <a:br>
+                <a:rPr lang="en-US" sz="1000" b="1" dirty="0" smtClean="0"/>
+              </a:br>
+              <a:r>
+                <a:rPr lang="en-US" sz="1000" b="1" dirty="0" smtClean="0"/>
+                <a:t>RDS</a:t>
+              </a:r>
+              <a:endParaRPr lang="en-US" b="1" dirty="0"/>
+            </a:p>
+          </p:txBody>
+        </p:sp>
+      </p:grpSp>
+      <p:grpSp>
+        <p:nvGrpSpPr>
+          <p:cNvPr id="26" name="図形グループ 25"/>
+          <p:cNvGrpSpPr/>
+          <p:nvPr/>
+        </p:nvGrpSpPr>
+        <p:grpSpPr>
+          <a:xfrm>
+            <a:off x="572888" y="878176"/>
+            <a:ext cx="643781" cy="836556"/>
+            <a:chOff x="-1225976" y="1036405"/>
+            <a:chExt cx="643781" cy="836556"/>
+          </a:xfrm>
+        </p:grpSpPr>
+        <p:pic>
+          <p:nvPicPr>
+            <p:cNvPr id="105" name="Picture 7"/>
+            <p:cNvPicPr>
+              <a:picLocks noChangeAspect="1"/>
+            </p:cNvPicPr>
+            <p:nvPr/>
+          </p:nvPicPr>
+          <p:blipFill>
+            <a:blip r:embed="rId9">
+              <a:extLst>
+                <a:ext uri="{28A0092B-C50C-407E-A947-70E740481C1C}">
+                  <a14:useLocalDpi xmlns:a14="http://schemas.microsoft.com/office/drawing/2010/main" val="0"/>
+                </a:ext>
+              </a:extLst>
+            </a:blip>
+            <a:stretch>
+              <a:fillRect/>
+            </a:stretch>
+          </p:blipFill>
+          <p:spPr>
+            <a:xfrm>
+              <a:off x="-1176476" y="1036405"/>
+              <a:ext cx="544781" cy="653738"/>
+            </a:xfrm>
+            <a:prstGeom prst="rect">
+              <a:avLst/>
+            </a:prstGeom>
+          </p:spPr>
+        </p:pic>
+        <p:sp>
+          <p:nvSpPr>
+            <p:cNvPr id="106" name="TextBox 213"/>
+            <p:cNvSpPr txBox="1"/>
+            <p:nvPr/>
+          </p:nvSpPr>
+          <p:spPr>
+            <a:xfrm>
+              <a:off x="-1225976" y="1717329"/>
+              <a:ext cx="643781" cy="155632"/>
+            </a:xfrm>
+            <a:prstGeom prst="rect">
+              <a:avLst/>
+            </a:prstGeom>
+            <a:noFill/>
+          </p:spPr>
+          <p:txBody>
+            <a:bodyPr wrap="square" lIns="0" tIns="0" rIns="0" bIns="0" rtlCol="0" anchor="t">
+              <a:noAutofit/>
+            </a:bodyPr>
+            <a:lstStyle/>
+            <a:p>
+              <a:pPr algn="ctr"/>
+              <a:r>
+                <a:rPr lang="en-US" sz="1000" b="1" dirty="0" smtClean="0"/>
+                <a:t>Amazon EC2</a:t>
+              </a:r>
+              <a:endParaRPr lang="en-US" b="1" dirty="0"/>
+            </a:p>
+          </p:txBody>
+        </p:sp>
+      </p:grpSp>
+      <p:grpSp>
+        <p:nvGrpSpPr>
+          <p:cNvPr id="29" name="図形グループ 28"/>
+          <p:cNvGrpSpPr/>
+          <p:nvPr/>
+        </p:nvGrpSpPr>
+        <p:grpSpPr>
+          <a:xfrm>
+            <a:off x="13183396" y="915835"/>
+            <a:ext cx="894752" cy="816688"/>
+            <a:chOff x="12990515" y="3971434"/>
+            <a:chExt cx="894752" cy="816688"/>
+          </a:xfrm>
+        </p:grpSpPr>
+        <p:pic>
+          <p:nvPicPr>
+            <p:cNvPr id="108" name="Picture 113"/>
+            <p:cNvPicPr>
+              <a:picLocks noChangeAspect="1"/>
+            </p:cNvPicPr>
+            <p:nvPr/>
+          </p:nvPicPr>
+          <p:blipFill>
+            <a:blip r:embed="rId10">
+              <a:extLst>
+                <a:ext uri="{28A0092B-C50C-407E-A947-70E740481C1C}">
+                  <a14:useLocalDpi xmlns:a14="http://schemas.microsoft.com/office/drawing/2010/main" val="0"/>
+                </a:ext>
+              </a:extLst>
+            </a:blip>
+            <a:stretch>
+              <a:fillRect/>
+            </a:stretch>
+          </p:blipFill>
+          <p:spPr>
+            <a:xfrm>
+              <a:off x="13183778" y="3971434"/>
+              <a:ext cx="544780" cy="653736"/>
+            </a:xfrm>
+            <a:prstGeom prst="rect">
+              <a:avLst/>
+            </a:prstGeom>
+          </p:spPr>
+        </p:pic>
+        <p:sp>
+          <p:nvSpPr>
+            <p:cNvPr id="112" name="TextBox 594"/>
+            <p:cNvSpPr txBox="1"/>
+            <p:nvPr/>
+          </p:nvSpPr>
+          <p:spPr>
+            <a:xfrm>
+              <a:off x="12990515" y="4632490"/>
+              <a:ext cx="894752" cy="155632"/>
+            </a:xfrm>
+            <a:prstGeom prst="rect">
+              <a:avLst/>
+            </a:prstGeom>
+            <a:noFill/>
+          </p:spPr>
+          <p:txBody>
+            <a:bodyPr wrap="square" lIns="0" tIns="0" rIns="0" bIns="0" rtlCol="0" anchor="t">
+              <a:noAutofit/>
+            </a:bodyPr>
+            <a:lstStyle/>
+            <a:p>
+              <a:pPr algn="ctr"/>
+              <a:r>
+                <a:rPr lang="en-US" sz="1000" b="1" dirty="0" smtClean="0"/>
+                <a:t>Amazon</a:t>
+              </a:r>
+              <a:br>
+                <a:rPr lang="en-US" sz="1000" b="1" dirty="0" smtClean="0"/>
+              </a:br>
+              <a:r>
+                <a:rPr lang="en-US" sz="1000" b="1" dirty="0" smtClean="0"/>
+                <a:t>SQS</a:t>
+              </a:r>
+              <a:endParaRPr lang="en-US" b="1" dirty="0"/>
+            </a:p>
+          </p:txBody>
+        </p:sp>
+      </p:grpSp>
+      <p:pic>
+        <p:nvPicPr>
+          <p:cNvPr id="114" name="Picture 14"/>
+          <p:cNvPicPr>
+            <a:picLocks noChangeAspect="1"/>
+          </p:cNvPicPr>
+          <p:nvPr/>
+        </p:nvPicPr>
+        <p:blipFill>
+          <a:blip r:embed="rId11">
+            <a:extLst>
+              <a:ext uri="{28A0092B-C50C-407E-A947-70E740481C1C}">
+                <a14:useLocalDpi xmlns:a14="http://schemas.microsoft.com/office/drawing/2010/main" val="0"/>
+              </a:ext>
+            </a:extLst>
+          </a:blip>
+          <a:stretch>
+            <a:fillRect/>
+          </a:stretch>
+        </p:blipFill>
+        <p:spPr>
+          <a:xfrm>
+            <a:off x="124578" y="419484"/>
+            <a:ext cx="603504" cy="393954"/>
+          </a:xfrm>
+          <a:prstGeom prst="rect">
+            <a:avLst/>
+          </a:prstGeom>
+        </p:spPr>
+      </p:pic>
+      <p:pic>
+        <p:nvPicPr>
+          <p:cNvPr id="117" name="Picture 14"/>
+          <p:cNvPicPr>
+            <a:picLocks noChangeAspect="1"/>
+          </p:cNvPicPr>
+          <p:nvPr/>
+        </p:nvPicPr>
+        <p:blipFill>
+          <a:blip r:embed="rId11">
+            <a:extLst>
+              <a:ext uri="{28A0092B-C50C-407E-A947-70E740481C1C}">
+                <a14:useLocalDpi xmlns:a14="http://schemas.microsoft.com/office/drawing/2010/main" val="0"/>
+              </a:ext>
+            </a:extLst>
+          </a:blip>
+          <a:stretch>
+            <a:fillRect/>
+          </a:stretch>
+        </p:blipFill>
+        <p:spPr>
+          <a:xfrm>
+            <a:off x="155324" y="5716750"/>
+            <a:ext cx="603504" cy="393954"/>
+          </a:xfrm>
+          <a:prstGeom prst="rect">
+            <a:avLst/>
+          </a:prstGeom>
+        </p:spPr>
+      </p:pic>
+      <p:pic>
+        <p:nvPicPr>
+          <p:cNvPr id="118" name="Picture 14"/>
+          <p:cNvPicPr>
+            <a:picLocks noChangeAspect="1"/>
+          </p:cNvPicPr>
+          <p:nvPr/>
+        </p:nvPicPr>
+        <p:blipFill>
+          <a:blip r:embed="rId11">
+            <a:extLst>
+              <a:ext uri="{28A0092B-C50C-407E-A947-70E740481C1C}">
+                <a14:useLocalDpi xmlns:a14="http://schemas.microsoft.com/office/drawing/2010/main" val="0"/>
+              </a:ext>
+            </a:extLst>
+          </a:blip>
+          <a:stretch>
+            <a:fillRect/>
+          </a:stretch>
+        </p:blipFill>
+        <p:spPr>
+          <a:xfrm>
+            <a:off x="13811121" y="459989"/>
+            <a:ext cx="603504" cy="393954"/>
+          </a:xfrm>
+          <a:prstGeom prst="rect">
+            <a:avLst/>
+          </a:prstGeom>
+        </p:spPr>
+      </p:pic>
+      <p:cxnSp>
+        <p:nvCxnSpPr>
+          <p:cNvPr id="121" name="直線矢印コネクタ 120"/>
+          <p:cNvCxnSpPr/>
+          <p:nvPr/>
+        </p:nvCxnSpPr>
+        <p:spPr>
+          <a:xfrm>
+            <a:off x="11954466" y="9388945"/>
+            <a:ext cx="817620" cy="0"/>
+          </a:xfrm>
+          <a:prstGeom prst="straightConnector1">
+            <a:avLst/>
+          </a:prstGeom>
+          <a:ln w="38100">
+            <a:solidFill>
+              <a:schemeClr val="accent2">
+                <a:lumMod val="60000"/>
+                <a:lumOff val="40000"/>
+              </a:schemeClr>
+            </a:solidFill>
+            <a:tailEnd type="triangle"/>
+          </a:ln>
+        </p:spPr>
+        <p:style>
+          <a:lnRef idx="1">
+            <a:schemeClr val="accent1"/>
+          </a:lnRef>
+          <a:fillRef idx="0">
+            <a:schemeClr val="accent1"/>
+          </a:fillRef>
+          <a:effectRef idx="0">
+            <a:schemeClr val="accent1"/>
+          </a:effectRef>
+          <a:fontRef idx="minor">
+            <a:schemeClr val="tx1"/>
+          </a:fontRef>
+        </p:style>
+      </p:cxnSp>
+      <p:sp>
+        <p:nvSpPr>
+          <p:cNvPr id="122" name="テキスト ボックス 121"/>
+          <p:cNvSpPr txBox="1"/>
+          <p:nvPr/>
+        </p:nvSpPr>
+        <p:spPr>
+          <a:xfrm>
+            <a:off x="12071687" y="9021535"/>
+            <a:ext cx="482824" cy="276999"/>
+          </a:xfrm>
+          <a:prstGeom prst="rect">
+            <a:avLst/>
+          </a:prstGeom>
+          <a:noFill/>
+        </p:spPr>
+        <p:txBody>
+          <a:bodyPr wrap="none" rtlCol="0">
+            <a:spAutoFit/>
+          </a:bodyPr>
+          <a:lstStyle/>
+          <a:p>
+            <a:r>
+              <a:rPr kumimoji="1" lang="en-US" altLang="ja-JP" sz="1200" dirty="0" smtClean="0"/>
+              <a:t>JMS</a:t>
+            </a:r>
+            <a:endParaRPr kumimoji="1" lang="ja-JP" altLang="en-US" sz="1200" dirty="0"/>
+          </a:p>
+        </p:txBody>
+      </p:sp>
+      <p:cxnSp>
+        <p:nvCxnSpPr>
+          <p:cNvPr id="123" name="直線矢印コネクタ 122"/>
+          <p:cNvCxnSpPr>
+            <a:stCxn id="92" idx="3"/>
+            <a:endCxn id="94" idx="2"/>
+          </p:cNvCxnSpPr>
+          <p:nvPr/>
+        </p:nvCxnSpPr>
+        <p:spPr>
+          <a:xfrm flipV="1">
+            <a:off x="13215198" y="1991392"/>
+            <a:ext cx="396785" cy="1255597"/>
+          </a:xfrm>
+          <a:prstGeom prst="bentConnector2">
+            <a:avLst/>
+          </a:prstGeom>
+          <a:ln w="38100">
+            <a:solidFill>
+              <a:schemeClr val="accent2">
+                <a:lumMod val="60000"/>
+                <a:lumOff val="40000"/>
+              </a:schemeClr>
+            </a:solidFill>
+            <a:tailEnd type="triangle"/>
+          </a:ln>
+        </p:spPr>
+        <p:style>
+          <a:lnRef idx="1">
+            <a:schemeClr val="accent1"/>
+          </a:lnRef>
+          <a:fillRef idx="0">
+            <a:schemeClr val="accent1"/>
+          </a:fillRef>
+          <a:effectRef idx="0">
+            <a:schemeClr val="accent1"/>
+          </a:effectRef>
+          <a:fontRef idx="minor">
+            <a:schemeClr val="tx1"/>
+          </a:fontRef>
+        </p:style>
+      </p:cxnSp>
+      <p:cxnSp>
+        <p:nvCxnSpPr>
+          <p:cNvPr id="137" name="直線矢印コネクタ 136"/>
+          <p:cNvCxnSpPr/>
+          <p:nvPr/>
+        </p:nvCxnSpPr>
+        <p:spPr>
+          <a:xfrm>
+            <a:off x="12481402" y="45433"/>
+            <a:ext cx="14116" cy="2744356"/>
+          </a:xfrm>
+          <a:prstGeom prst="straightConnector1">
+            <a:avLst/>
+          </a:prstGeom>
+          <a:ln w="38100">
+            <a:solidFill>
+              <a:schemeClr val="accent6">
+                <a:lumMod val="60000"/>
+                <a:lumOff val="40000"/>
+              </a:schemeClr>
+            </a:solidFill>
+            <a:tailEnd type="triangle"/>
+          </a:ln>
+        </p:spPr>
+        <p:style>
+          <a:lnRef idx="1">
+            <a:schemeClr val="accent1"/>
+          </a:lnRef>
+          <a:fillRef idx="0">
+            <a:schemeClr val="accent1"/>
+          </a:fillRef>
+          <a:effectRef idx="0">
+            <a:schemeClr val="accent1"/>
+          </a:effectRef>
+          <a:fontRef idx="minor">
+            <a:schemeClr val="tx1"/>
+          </a:fontRef>
+        </p:style>
+      </p:cxnSp>
+      <p:sp>
+        <p:nvSpPr>
+          <p:cNvPr id="52" name="角丸四角形 51"/>
+          <p:cNvSpPr/>
+          <p:nvPr/>
+        </p:nvSpPr>
+        <p:spPr>
+          <a:xfrm>
+            <a:off x="1828677" y="1328617"/>
+            <a:ext cx="10848326" cy="478037"/>
+          </a:xfrm>
+          <a:prstGeom prst="roundRect">
+            <a:avLst/>
+          </a:prstGeom>
+          <a:solidFill>
+            <a:srgbClr val="182BA2"/>
+          </a:solidFill>
+        </p:spPr>
+        <p:style>
+          <a:lnRef idx="1">
+            <a:schemeClr val="accent1"/>
+          </a:lnRef>
+          <a:fillRef idx="1002">
+            <a:schemeClr val="dk2"/>
+          </a:fillRef>
+          <a:effectRef idx="1">
+            <a:schemeClr val="accent1"/>
+          </a:effectRef>
+          <a:fontRef idx="minor">
+            <a:schemeClr val="dk1"/>
+          </a:fontRef>
+        </p:style>
+        <p:txBody>
+          <a:bodyPr rtlCol="0" anchor="ctr"/>
+          <a:lstStyle/>
+          <a:p>
+            <a:pPr algn="ctr"/>
+            <a:r>
+              <a:rPr lang="en-US" altLang="ja-JP" b="1" dirty="0" smtClean="0">
+                <a:solidFill>
+                  <a:schemeClr val="bg1"/>
+                </a:solidFill>
+              </a:rPr>
+              <a:t>Apache</a:t>
+            </a:r>
+          </a:p>
+        </p:txBody>
+      </p:sp>
+      <p:sp>
+        <p:nvSpPr>
+          <p:cNvPr id="138" name="テキスト ボックス 137"/>
+          <p:cNvSpPr txBox="1"/>
+          <p:nvPr/>
+        </p:nvSpPr>
+        <p:spPr>
+          <a:xfrm>
+            <a:off x="11497296" y="956295"/>
+            <a:ext cx="965329" cy="369332"/>
+          </a:xfrm>
+          <a:prstGeom prst="rect">
+            <a:avLst/>
+          </a:prstGeom>
+          <a:noFill/>
+        </p:spPr>
+        <p:txBody>
+          <a:bodyPr wrap="none" rtlCol="0">
+            <a:spAutoFit/>
+          </a:bodyPr>
+          <a:lstStyle/>
+          <a:p>
+            <a:r>
+              <a:rPr lang="en-US" altLang="ja-JP" dirty="0" smtClean="0"/>
+              <a:t>/ </a:t>
+            </a:r>
+            <a:r>
+              <a:rPr lang="en-US" altLang="ja-JP" dirty="0" err="1" smtClean="0"/>
+              <a:t>jms</a:t>
+            </a:r>
+            <a:r>
+              <a:rPr lang="en-US" altLang="ja-JP" dirty="0" smtClean="0"/>
+              <a:t>-c</a:t>
+            </a:r>
+            <a:endParaRPr kumimoji="1" lang="ja-JP" altLang="en-US" dirty="0"/>
+          </a:p>
+        </p:txBody>
+      </p:sp>
+      <p:pic>
+        <p:nvPicPr>
+          <p:cNvPr id="139" name="Picture 2" descr="https://httpd.apache.org/docs/current/ja/images/feather.png"/>
           <p:cNvPicPr>
             <a:picLocks noChangeAspect="1" noChangeArrowheads="1"/>
           </p:cNvPicPr>
@@ -6448,8 +8267,8 @@
         </p:blipFill>
         <p:spPr bwMode="auto">
           <a:xfrm>
-            <a:off x="4436862" y="4792135"/>
-            <a:ext cx="475335" cy="338999"/>
+            <a:off x="7897248" y="1417611"/>
+            <a:ext cx="1208719" cy="341171"/>
           </a:xfrm>
           <a:prstGeom prst="rect">
             <a:avLst/>
@@ -6466,230 +8285,15 @@
           </a:extLst>
         </p:spPr>
       </p:pic>
-      <p:pic>
-        <p:nvPicPr>
-          <p:cNvPr id="64" name="Picture 6" descr="omcat Home">
-            <a:hlinkClick r:id="rId4"/>
-          </p:cNvPr>
-          <p:cNvPicPr>
-            <a:picLocks noChangeAspect="1" noChangeArrowheads="1"/>
-          </p:cNvPicPr>
-          <p:nvPr/>
-        </p:nvPicPr>
-        <p:blipFill>
-          <a:blip r:embed="rId5">
-            <a:extLst>
-              <a:ext uri="{28A0092B-C50C-407E-A947-70E740481C1C}">
-                <a14:useLocalDpi xmlns:a14="http://schemas.microsoft.com/office/drawing/2010/main" val="0"/>
-              </a:ext>
-            </a:extLst>
-          </a:blip>
-          <a:srcRect/>
-          <a:stretch>
-            <a:fillRect/>
-          </a:stretch>
-        </p:blipFill>
-        <p:spPr bwMode="auto">
-          <a:xfrm>
-            <a:off x="3277160" y="3385587"/>
-            <a:ext cx="475335" cy="338999"/>
-          </a:xfrm>
-          <a:prstGeom prst="rect">
-            <a:avLst/>
-          </a:prstGeom>
-          <a:noFill/>
-          <a:extLst>
-            <a:ext uri="{909E8E84-426E-40DD-AFC4-6F175D3DCCD1}">
-              <a14:hiddenFill xmlns:a14="http://schemas.microsoft.com/office/drawing/2010/main">
-                <a:solidFill>
-                  <a:srgbClr val="FFFFFF"/>
-                </a:solidFill>
-              </a14:hiddenFill>
-            </a:ext>
-          </a:extLst>
-        </p:spPr>
-      </p:pic>
-      <p:pic>
-        <p:nvPicPr>
-          <p:cNvPr id="65" name="Picture 6" descr="omcat Home">
-            <a:hlinkClick r:id="rId4"/>
-          </p:cNvPr>
-          <p:cNvPicPr>
-            <a:picLocks noChangeAspect="1" noChangeArrowheads="1"/>
-          </p:cNvPicPr>
-          <p:nvPr/>
-        </p:nvPicPr>
-        <p:blipFill>
-          <a:blip r:embed="rId5">
-            <a:extLst>
-              <a:ext uri="{28A0092B-C50C-407E-A947-70E740481C1C}">
-                <a14:useLocalDpi xmlns:a14="http://schemas.microsoft.com/office/drawing/2010/main" val="0"/>
-              </a:ext>
-            </a:extLst>
-          </a:blip>
-          <a:srcRect/>
-          <a:stretch>
-            <a:fillRect/>
-          </a:stretch>
-        </p:blipFill>
-        <p:spPr bwMode="auto">
-          <a:xfrm>
-            <a:off x="6503220" y="3391358"/>
-            <a:ext cx="475335" cy="338999"/>
-          </a:xfrm>
-          <a:prstGeom prst="rect">
-            <a:avLst/>
-          </a:prstGeom>
-          <a:noFill/>
-          <a:extLst>
-            <a:ext uri="{909E8E84-426E-40DD-AFC4-6F175D3DCCD1}">
-              <a14:hiddenFill xmlns:a14="http://schemas.microsoft.com/office/drawing/2010/main">
-                <a:solidFill>
-                  <a:srgbClr val="FFFFFF"/>
-                </a:solidFill>
-              </a14:hiddenFill>
-            </a:ext>
-          </a:extLst>
-        </p:spPr>
-      </p:pic>
-      <p:pic>
-        <p:nvPicPr>
-          <p:cNvPr id="67" name="Picture 6" descr="omcat Home">
-            <a:hlinkClick r:id="rId4"/>
-          </p:cNvPr>
-          <p:cNvPicPr>
-            <a:picLocks noChangeAspect="1" noChangeArrowheads="1"/>
-          </p:cNvPicPr>
-          <p:nvPr/>
-        </p:nvPicPr>
-        <p:blipFill>
-          <a:blip r:embed="rId5">
-            <a:extLst>
-              <a:ext uri="{28A0092B-C50C-407E-A947-70E740481C1C}">
-                <a14:useLocalDpi xmlns:a14="http://schemas.microsoft.com/office/drawing/2010/main" val="0"/>
-              </a:ext>
-            </a:extLst>
-          </a:blip>
-          <a:srcRect/>
-          <a:stretch>
-            <a:fillRect/>
-          </a:stretch>
-        </p:blipFill>
-        <p:spPr bwMode="auto">
-          <a:xfrm>
-            <a:off x="8501446" y="3381845"/>
-            <a:ext cx="475335" cy="338999"/>
-          </a:xfrm>
-          <a:prstGeom prst="rect">
-            <a:avLst/>
-          </a:prstGeom>
-          <a:noFill/>
-          <a:extLst>
-            <a:ext uri="{909E8E84-426E-40DD-AFC4-6F175D3DCCD1}">
-              <a14:hiddenFill xmlns:a14="http://schemas.microsoft.com/office/drawing/2010/main">
-                <a:solidFill>
-                  <a:srgbClr val="FFFFFF"/>
-                </a:solidFill>
-              </a14:hiddenFill>
-            </a:ext>
-          </a:extLst>
-        </p:spPr>
-      </p:pic>
-      <p:pic>
-        <p:nvPicPr>
-          <p:cNvPr id="68" name="Picture 6" descr="omcat Home">
-            <a:hlinkClick r:id="rId4"/>
-          </p:cNvPr>
-          <p:cNvPicPr>
-            <a:picLocks noChangeAspect="1" noChangeArrowheads="1"/>
-          </p:cNvPicPr>
-          <p:nvPr/>
-        </p:nvPicPr>
-        <p:blipFill>
-          <a:blip r:embed="rId5">
-            <a:extLst>
-              <a:ext uri="{28A0092B-C50C-407E-A947-70E740481C1C}">
-                <a14:useLocalDpi xmlns:a14="http://schemas.microsoft.com/office/drawing/2010/main" val="0"/>
-              </a:ext>
-            </a:extLst>
-          </a:blip>
-          <a:srcRect/>
-          <a:stretch>
-            <a:fillRect/>
-          </a:stretch>
-        </p:blipFill>
-        <p:spPr bwMode="auto">
-          <a:xfrm>
-            <a:off x="10449098" y="3393568"/>
-            <a:ext cx="475335" cy="338999"/>
-          </a:xfrm>
-          <a:prstGeom prst="rect">
-            <a:avLst/>
-          </a:prstGeom>
-          <a:noFill/>
-          <a:extLst>
-            <a:ext uri="{909E8E84-426E-40DD-AFC4-6F175D3DCCD1}">
-              <a14:hiddenFill xmlns:a14="http://schemas.microsoft.com/office/drawing/2010/main">
-                <a:solidFill>
-                  <a:srgbClr val="FFFFFF"/>
-                </a:solidFill>
-              </a14:hiddenFill>
-            </a:ext>
-          </a:extLst>
-        </p:spPr>
-      </p:pic>
-      <p:pic>
-        <p:nvPicPr>
-          <p:cNvPr id="70" name="Picture 6" descr="omcat Home">
-            <a:hlinkClick r:id="rId4"/>
-          </p:cNvPr>
-          <p:cNvPicPr>
-            <a:picLocks noChangeAspect="1" noChangeArrowheads="1"/>
-          </p:cNvPicPr>
-          <p:nvPr/>
-        </p:nvPicPr>
-        <p:blipFill>
-          <a:blip r:embed="rId5">
-            <a:extLst>
-              <a:ext uri="{28A0092B-C50C-407E-A947-70E740481C1C}">
-                <a14:useLocalDpi xmlns:a14="http://schemas.microsoft.com/office/drawing/2010/main" val="0"/>
-              </a:ext>
-            </a:extLst>
-          </a:blip>
-          <a:srcRect/>
-          <a:stretch>
-            <a:fillRect/>
-          </a:stretch>
-        </p:blipFill>
-        <p:spPr bwMode="auto">
-          <a:xfrm>
-            <a:off x="11526230" y="4818767"/>
-            <a:ext cx="475335" cy="338999"/>
-          </a:xfrm>
-          <a:prstGeom prst="rect">
-            <a:avLst/>
-          </a:prstGeom>
-          <a:noFill/>
-          <a:extLst>
-            <a:ext uri="{909E8E84-426E-40DD-AFC4-6F175D3DCCD1}">
-              <a14:hiddenFill xmlns:a14="http://schemas.microsoft.com/office/drawing/2010/main">
-                <a:solidFill>
-                  <a:srgbClr val="FFFFFF"/>
-                </a:solidFill>
-              </a14:hiddenFill>
-            </a:ext>
-          </a:extLst>
-        </p:spPr>
-      </p:pic>
-      <p:sp>
-        <p:nvSpPr>
-          <p:cNvPr id="71" name="テキスト ボックス 70"/>
+      <p:sp>
+        <p:nvSpPr>
+          <p:cNvPr id="141" name="テキスト ボックス 140"/>
           <p:cNvSpPr txBox="1"/>
           <p:nvPr/>
         </p:nvSpPr>
         <p:spPr>
           <a:xfrm>
-            <a:off x="8356759" y="1349311"/>
+            <a:off x="9018755" y="1419193"/>
             <a:ext cx="450764" cy="369332"/>
           </a:xfrm>
           <a:prstGeom prst="rect">
@@ -6704,7 +8308,7 @@
           <a:lstStyle/>
           <a:p>
             <a:r>
-              <a:rPr kumimoji="1" lang="en-US" altLang="ja-JP" b="1" smtClean="0">
+              <a:rPr kumimoji="1" lang="en-US" altLang="ja-JP" b="1" dirty="0" smtClean="0">
                 <a:solidFill>
                   <a:schemeClr val="bg1"/>
                 </a:solidFill>
@@ -6719,678 +8323,29 @@
           </a:p>
         </p:txBody>
       </p:sp>
-      <p:pic>
-        <p:nvPicPr>
-          <p:cNvPr id="74" name="Picture 2" descr="https://httpd.apache.org/docs/current/ja/images/feather.png"/>
-          <p:cNvPicPr>
-            <a:picLocks noChangeAspect="1" noChangeArrowheads="1"/>
-          </p:cNvPicPr>
-          <p:nvPr/>
-        </p:nvPicPr>
-        <p:blipFill>
-          <a:blip r:embed="rId3">
-            <a:extLst>
-              <a:ext uri="{28A0092B-C50C-407E-A947-70E740481C1C}">
-                <a14:useLocalDpi xmlns:a14="http://schemas.microsoft.com/office/drawing/2010/main" val="0"/>
-              </a:ext>
-            </a:extLst>
-          </a:blip>
-          <a:srcRect/>
-          <a:stretch>
-            <a:fillRect/>
-          </a:stretch>
-        </p:blipFill>
-        <p:spPr bwMode="auto">
-          <a:xfrm>
-            <a:off x="4798065" y="8731182"/>
-            <a:ext cx="777823" cy="219547"/>
-          </a:xfrm>
-          <a:prstGeom prst="rect">
-            <a:avLst/>
-          </a:prstGeom>
-          <a:noFill/>
-          <a:extLst>
-            <a:ext uri="{909E8E84-426E-40DD-AFC4-6F175D3DCCD1}">
-              <a14:hiddenFill xmlns:a14="http://schemas.microsoft.com/office/drawing/2010/main">
-                <a:solidFill>
-                  <a:srgbClr val="FFFFFF"/>
-                </a:solidFill>
-              </a14:hiddenFill>
-            </a:ext>
-          </a:extLst>
-        </p:spPr>
-      </p:pic>
-      <p:pic>
-        <p:nvPicPr>
-          <p:cNvPr id="75" name="Picture 6" descr="omcat Home">
-            <a:hlinkClick r:id="rId4"/>
-          </p:cNvPr>
-          <p:cNvPicPr>
-            <a:picLocks noChangeAspect="1" noChangeArrowheads="1"/>
-          </p:cNvPicPr>
-          <p:nvPr/>
-        </p:nvPicPr>
-        <p:blipFill>
-          <a:blip r:embed="rId5">
-            <a:extLst>
-              <a:ext uri="{28A0092B-C50C-407E-A947-70E740481C1C}">
-                <a14:useLocalDpi xmlns:a14="http://schemas.microsoft.com/office/drawing/2010/main" val="0"/>
-              </a:ext>
-            </a:extLst>
-          </a:blip>
-          <a:srcRect/>
-          <a:stretch>
-            <a:fillRect/>
-          </a:stretch>
-        </p:blipFill>
-        <p:spPr bwMode="auto">
-          <a:xfrm>
-            <a:off x="5919110" y="8635889"/>
-            <a:ext cx="475335" cy="338999"/>
-          </a:xfrm>
-          <a:prstGeom prst="rect">
-            <a:avLst/>
-          </a:prstGeom>
-          <a:noFill/>
-          <a:extLst>
-            <a:ext uri="{909E8E84-426E-40DD-AFC4-6F175D3DCCD1}">
-              <a14:hiddenFill xmlns:a14="http://schemas.microsoft.com/office/drawing/2010/main">
-                <a:solidFill>
-                  <a:srgbClr val="FFFFFF"/>
-                </a:solidFill>
-              </a14:hiddenFill>
-            </a:ext>
-          </a:extLst>
-        </p:spPr>
-      </p:pic>
-      <p:sp>
-        <p:nvSpPr>
-          <p:cNvPr id="76" name="テキスト ボックス 75"/>
-          <p:cNvSpPr txBox="1"/>
-          <p:nvPr/>
-        </p:nvSpPr>
-        <p:spPr>
-          <a:xfrm>
-            <a:off x="4702087" y="8982116"/>
-            <a:ext cx="970137" cy="276999"/>
-          </a:xfrm>
-          <a:prstGeom prst="rect">
-            <a:avLst/>
-          </a:prstGeom>
-          <a:noFill/>
-        </p:spPr>
-        <p:txBody>
-          <a:bodyPr wrap="none" rtlCol="0">
-            <a:spAutoFit/>
-          </a:bodyPr>
-          <a:lstStyle/>
-          <a:p>
-            <a:r>
-              <a:rPr lang="en-US" altLang="ja-JP" sz="1200" dirty="0" smtClean="0"/>
-              <a:t>Apache 2.2</a:t>
-            </a:r>
-            <a:endParaRPr kumimoji="1" lang="ja-JP" altLang="en-US" sz="1200" dirty="0"/>
-          </a:p>
-        </p:txBody>
-      </p:sp>
-      <p:sp>
-        <p:nvSpPr>
-          <p:cNvPr id="77" name="テキスト ボックス 76"/>
-          <p:cNvSpPr txBox="1"/>
-          <p:nvPr/>
-        </p:nvSpPr>
-        <p:spPr>
-          <a:xfrm>
-            <a:off x="5682666" y="8986473"/>
-            <a:ext cx="974947" cy="276999"/>
-          </a:xfrm>
-          <a:prstGeom prst="rect">
-            <a:avLst/>
-          </a:prstGeom>
-          <a:noFill/>
-        </p:spPr>
-        <p:txBody>
-          <a:bodyPr wrap="none" rtlCol="0">
-            <a:spAutoFit/>
-          </a:bodyPr>
-          <a:lstStyle/>
-          <a:p>
-            <a:r>
-              <a:rPr lang="en-US" altLang="ja-JP" sz="1200" smtClean="0"/>
-              <a:t>Tomcat 8.0</a:t>
-            </a:r>
-            <a:endParaRPr kumimoji="1" lang="ja-JP" altLang="en-US" sz="1200" dirty="0"/>
-          </a:p>
-        </p:txBody>
-      </p:sp>
-      <p:pic>
-        <p:nvPicPr>
-          <p:cNvPr id="1033" name="Picture 9" descr="2 database logo"/>
-          <p:cNvPicPr>
-            <a:picLocks noChangeAspect="1" noChangeArrowheads="1"/>
-          </p:cNvPicPr>
-          <p:nvPr/>
-        </p:nvPicPr>
-        <p:blipFill>
-          <a:blip r:embed="rId6">
-            <a:extLst>
-              <a:ext uri="{28A0092B-C50C-407E-A947-70E740481C1C}">
-                <a14:useLocalDpi xmlns:a14="http://schemas.microsoft.com/office/drawing/2010/main" val="0"/>
-              </a:ext>
-            </a:extLst>
-          </a:blip>
-          <a:srcRect/>
-          <a:stretch>
-            <a:fillRect/>
-          </a:stretch>
-        </p:blipFill>
-        <p:spPr bwMode="auto">
-          <a:xfrm>
-            <a:off x="9736814" y="6694132"/>
-            <a:ext cx="661640" cy="360010"/>
-          </a:xfrm>
-          <a:prstGeom prst="rect">
-            <a:avLst/>
-          </a:prstGeom>
-          <a:noFill/>
-          <a:extLst>
-            <a:ext uri="{909E8E84-426E-40DD-AFC4-6F175D3DCCD1}">
-              <a14:hiddenFill xmlns:a14="http://schemas.microsoft.com/office/drawing/2010/main">
-                <a:solidFill>
-                  <a:srgbClr val="FFFFFF"/>
-                </a:solidFill>
-              </a14:hiddenFill>
-            </a:ext>
-          </a:extLst>
-        </p:spPr>
-      </p:pic>
-      <p:pic>
-        <p:nvPicPr>
-          <p:cNvPr id="78" name="Picture 9" descr="2 database logo"/>
-          <p:cNvPicPr>
-            <a:picLocks noChangeAspect="1" noChangeArrowheads="1"/>
-          </p:cNvPicPr>
-          <p:nvPr/>
-        </p:nvPicPr>
-        <p:blipFill>
-          <a:blip r:embed="rId6">
-            <a:extLst>
-              <a:ext uri="{28A0092B-C50C-407E-A947-70E740481C1C}">
-                <a14:useLocalDpi xmlns:a14="http://schemas.microsoft.com/office/drawing/2010/main" val="0"/>
-              </a:ext>
-            </a:extLst>
-          </a:blip>
-          <a:srcRect/>
-          <a:stretch>
-            <a:fillRect/>
-          </a:stretch>
-        </p:blipFill>
-        <p:spPr bwMode="auto">
-          <a:xfrm>
-            <a:off x="8048591" y="8615823"/>
-            <a:ext cx="657855" cy="357950"/>
-          </a:xfrm>
-          <a:prstGeom prst="rect">
-            <a:avLst/>
-          </a:prstGeom>
-          <a:noFill/>
-          <a:extLst>
-            <a:ext uri="{909E8E84-426E-40DD-AFC4-6F175D3DCCD1}">
-              <a14:hiddenFill xmlns:a14="http://schemas.microsoft.com/office/drawing/2010/main">
-                <a:solidFill>
-                  <a:srgbClr val="FFFFFF"/>
-                </a:solidFill>
-              </a14:hiddenFill>
-            </a:ext>
-          </a:extLst>
-        </p:spPr>
-      </p:pic>
-      <p:sp>
-        <p:nvSpPr>
-          <p:cNvPr id="79" name="テキスト ボックス 78"/>
-          <p:cNvSpPr txBox="1"/>
-          <p:nvPr/>
-        </p:nvSpPr>
-        <p:spPr>
-          <a:xfrm>
-            <a:off x="8067893" y="8982117"/>
-            <a:ext cx="638315" cy="276999"/>
-          </a:xfrm>
-          <a:prstGeom prst="rect">
-            <a:avLst/>
-          </a:prstGeom>
-          <a:noFill/>
-        </p:spPr>
-        <p:txBody>
-          <a:bodyPr wrap="none" rtlCol="0">
-            <a:spAutoFit/>
-          </a:bodyPr>
-          <a:lstStyle/>
-          <a:p>
-            <a:pPr algn="ctr"/>
-            <a:r>
-              <a:rPr lang="en-US" altLang="ja-JP" sz="1200" dirty="0" smtClean="0"/>
-              <a:t>H2 1.4</a:t>
-            </a:r>
-            <a:endParaRPr kumimoji="1" lang="ja-JP" altLang="en-US" sz="1200" dirty="0"/>
-          </a:p>
-        </p:txBody>
-      </p:sp>
-      <p:sp>
-        <p:nvSpPr>
-          <p:cNvPr id="80" name="テキスト ボックス 79"/>
-          <p:cNvSpPr txBox="1"/>
-          <p:nvPr/>
-        </p:nvSpPr>
-        <p:spPr>
-          <a:xfrm>
-            <a:off x="2078237" y="949243"/>
-            <a:ext cx="840295" cy="369332"/>
-          </a:xfrm>
-          <a:prstGeom prst="rect">
-            <a:avLst/>
-          </a:prstGeom>
-          <a:noFill/>
-        </p:spPr>
-        <p:txBody>
-          <a:bodyPr wrap="none" rtlCol="0">
-            <a:spAutoFit/>
-          </a:bodyPr>
-          <a:lstStyle/>
-          <a:p>
-            <a:r>
-              <a:rPr lang="en-US" altLang="ja-JP" dirty="0" smtClean="0"/>
-              <a:t>/</a:t>
-            </a:r>
-            <a:r>
-              <a:rPr lang="en-US" altLang="ja-JP" dirty="0" err="1" smtClean="0"/>
-              <a:t>api</a:t>
-            </a:r>
-            <a:r>
-              <a:rPr lang="en-US" altLang="ja-JP" dirty="0" smtClean="0"/>
-              <a:t>-c</a:t>
-            </a:r>
-            <a:endParaRPr kumimoji="1" lang="ja-JP" altLang="en-US" dirty="0"/>
-          </a:p>
-        </p:txBody>
-      </p:sp>
-      <p:sp>
-        <p:nvSpPr>
-          <p:cNvPr id="81" name="テキスト ボックス 80"/>
-          <p:cNvSpPr txBox="1"/>
-          <p:nvPr/>
-        </p:nvSpPr>
-        <p:spPr>
-          <a:xfrm>
-            <a:off x="3220455" y="940298"/>
-            <a:ext cx="849913" cy="369332"/>
-          </a:xfrm>
-          <a:prstGeom prst="rect">
-            <a:avLst/>
-          </a:prstGeom>
-          <a:noFill/>
-        </p:spPr>
-        <p:txBody>
-          <a:bodyPr wrap="none" rtlCol="0">
-            <a:spAutoFit/>
-          </a:bodyPr>
-          <a:lstStyle/>
-          <a:p>
-            <a:r>
-              <a:rPr lang="en-US" altLang="ja-JP" dirty="0" smtClean="0"/>
-              <a:t>/</a:t>
-            </a:r>
-            <a:r>
-              <a:rPr lang="en-US" altLang="ja-JP" dirty="0" err="1" smtClean="0"/>
-              <a:t>api</a:t>
-            </a:r>
-            <a:r>
-              <a:rPr lang="en-US" altLang="ja-JP" dirty="0" smtClean="0"/>
-              <a:t>-a</a:t>
-            </a:r>
-            <a:endParaRPr kumimoji="1" lang="ja-JP" altLang="en-US" dirty="0"/>
-          </a:p>
-        </p:txBody>
-      </p:sp>
-      <p:sp>
-        <p:nvSpPr>
-          <p:cNvPr id="82" name="テキスト ボックス 81"/>
-          <p:cNvSpPr txBox="1"/>
-          <p:nvPr/>
-        </p:nvSpPr>
-        <p:spPr>
-          <a:xfrm>
-            <a:off x="5344696" y="956295"/>
-            <a:ext cx="798617" cy="369332"/>
-          </a:xfrm>
-          <a:prstGeom prst="rect">
-            <a:avLst/>
-          </a:prstGeom>
-          <a:noFill/>
-        </p:spPr>
-        <p:txBody>
-          <a:bodyPr wrap="none" rtlCol="0">
-            <a:spAutoFit/>
-          </a:bodyPr>
-          <a:lstStyle/>
-          <a:p>
-            <a:r>
-              <a:rPr lang="en-US" altLang="ja-JP" dirty="0" smtClean="0"/>
-              <a:t>/</a:t>
-            </a:r>
-            <a:r>
-              <a:rPr lang="en-US" altLang="ja-JP" dirty="0" err="1" smtClean="0"/>
-              <a:t>scr</a:t>
-            </a:r>
-            <a:r>
-              <a:rPr lang="en-US" altLang="ja-JP" dirty="0" smtClean="0"/>
-              <a:t>-t</a:t>
-            </a:r>
-            <a:endParaRPr kumimoji="1" lang="ja-JP" altLang="en-US" dirty="0"/>
-          </a:p>
-        </p:txBody>
-      </p:sp>
-      <p:sp>
-        <p:nvSpPr>
-          <p:cNvPr id="83" name="テキスト ボックス 82"/>
-          <p:cNvSpPr txBox="1"/>
-          <p:nvPr/>
-        </p:nvSpPr>
-        <p:spPr>
-          <a:xfrm>
-            <a:off x="7370684" y="963531"/>
-            <a:ext cx="798617" cy="369332"/>
-          </a:xfrm>
-          <a:prstGeom prst="rect">
-            <a:avLst/>
-          </a:prstGeom>
-          <a:noFill/>
-        </p:spPr>
-        <p:txBody>
-          <a:bodyPr wrap="none" rtlCol="0">
-            <a:spAutoFit/>
-          </a:bodyPr>
-          <a:lstStyle/>
-          <a:p>
-            <a:r>
-              <a:rPr lang="en-US" altLang="ja-JP" dirty="0" smtClean="0"/>
-              <a:t>/</a:t>
-            </a:r>
-            <a:r>
-              <a:rPr lang="en-US" altLang="ja-JP" dirty="0" err="1" smtClean="0"/>
-              <a:t>scr</a:t>
-            </a:r>
-            <a:r>
-              <a:rPr lang="en-US" altLang="ja-JP" dirty="0" smtClean="0"/>
-              <a:t>-f</a:t>
-            </a:r>
-            <a:endParaRPr kumimoji="1" lang="ja-JP" altLang="en-US" dirty="0"/>
-          </a:p>
-        </p:txBody>
-      </p:sp>
-      <p:sp>
-        <p:nvSpPr>
-          <p:cNvPr id="84" name="テキスト ボックス 83"/>
-          <p:cNvSpPr txBox="1"/>
-          <p:nvPr/>
-        </p:nvSpPr>
-        <p:spPr>
-          <a:xfrm>
-            <a:off x="9325433" y="950804"/>
-            <a:ext cx="798617" cy="369332"/>
-          </a:xfrm>
-          <a:prstGeom prst="rect">
-            <a:avLst/>
-          </a:prstGeom>
-          <a:noFill/>
-        </p:spPr>
-        <p:txBody>
-          <a:bodyPr wrap="none" rtlCol="0">
-            <a:spAutoFit/>
-          </a:bodyPr>
-          <a:lstStyle/>
-          <a:p>
-            <a:r>
-              <a:rPr lang="en-US" altLang="ja-JP" dirty="0" smtClean="0"/>
-              <a:t>/</a:t>
-            </a:r>
-            <a:r>
-              <a:rPr lang="en-US" altLang="ja-JP" dirty="0" err="1" smtClean="0"/>
-              <a:t>scr</a:t>
-            </a:r>
-            <a:r>
-              <a:rPr lang="en-US" altLang="ja-JP" dirty="0" smtClean="0"/>
-              <a:t>-j</a:t>
-            </a:r>
-            <a:endParaRPr kumimoji="1" lang="ja-JP" altLang="en-US" dirty="0"/>
-          </a:p>
-        </p:txBody>
-      </p:sp>
-      <p:sp>
-        <p:nvSpPr>
-          <p:cNvPr id="85" name="テキスト ボックス 84"/>
-          <p:cNvSpPr txBox="1"/>
-          <p:nvPr/>
-        </p:nvSpPr>
-        <p:spPr>
-          <a:xfrm>
-            <a:off x="10686765" y="969794"/>
-            <a:ext cx="564578" cy="369332"/>
-          </a:xfrm>
-          <a:prstGeom prst="rect">
-            <a:avLst/>
-          </a:prstGeom>
-          <a:noFill/>
-        </p:spPr>
-        <p:txBody>
-          <a:bodyPr wrap="none" rtlCol="0">
-            <a:spAutoFit/>
-          </a:bodyPr>
-          <a:lstStyle/>
-          <a:p>
-            <a:r>
-              <a:rPr lang="en-US" altLang="ja-JP" dirty="0" smtClean="0"/>
-              <a:t>/</a:t>
-            </a:r>
-            <a:r>
-              <a:rPr lang="en-US" altLang="ja-JP" dirty="0" err="1" smtClean="0"/>
-              <a:t>db</a:t>
-            </a:r>
-            <a:endParaRPr kumimoji="1" lang="ja-JP" altLang="en-US" dirty="0"/>
-          </a:p>
-        </p:txBody>
-      </p:sp>
-      <p:sp>
-        <p:nvSpPr>
-          <p:cNvPr id="93" name="正方形/長方形 92"/>
-          <p:cNvSpPr/>
-          <p:nvPr/>
-        </p:nvSpPr>
-        <p:spPr>
-          <a:xfrm>
-            <a:off x="1699719" y="855398"/>
-            <a:ext cx="10030164" cy="1055385"/>
-          </a:xfrm>
-          <a:prstGeom prst="rect">
-            <a:avLst/>
-          </a:prstGeom>
-          <a:noFill/>
-          <a:ln>
-            <a:solidFill>
-              <a:schemeClr val="bg1">
-                <a:lumMod val="65000"/>
-              </a:schemeClr>
-            </a:solidFill>
-            <a:prstDash val="dash"/>
-          </a:ln>
-        </p:spPr>
-        <p:style>
-          <a:lnRef idx="2">
-            <a:schemeClr val="accent1">
-              <a:shade val="50000"/>
-            </a:schemeClr>
-          </a:lnRef>
-          <a:fillRef idx="1">
-            <a:schemeClr val="accent1"/>
-          </a:fillRef>
-          <a:effectRef idx="0">
-            <a:schemeClr val="accent1"/>
-          </a:effectRef>
-          <a:fontRef idx="minor">
-            <a:schemeClr val="lt1"/>
-          </a:fontRef>
-        </p:style>
-        <p:txBody>
-          <a:bodyPr rtlCol="0" anchor="ctr"/>
-          <a:lstStyle/>
-          <a:p>
-            <a:pPr algn="ctr"/>
-            <a:endParaRPr kumimoji="1" lang="ja-JP" altLang="en-US"/>
-          </a:p>
-        </p:txBody>
-      </p:sp>
-      <p:sp>
-        <p:nvSpPr>
-          <p:cNvPr id="86" name="正方形/長方形 85"/>
-          <p:cNvSpPr/>
-          <p:nvPr/>
-        </p:nvSpPr>
-        <p:spPr>
-          <a:xfrm>
-            <a:off x="198063" y="5728629"/>
-            <a:ext cx="11531820" cy="2483934"/>
-          </a:xfrm>
-          <a:prstGeom prst="rect">
-            <a:avLst/>
-          </a:prstGeom>
-          <a:noFill/>
-          <a:ln w="28575">
-            <a:solidFill>
-              <a:schemeClr val="tx1">
-                <a:lumMod val="65000"/>
-                <a:lumOff val="35000"/>
-              </a:schemeClr>
-            </a:solidFill>
-            <a:prstDash val="dash"/>
-          </a:ln>
-        </p:spPr>
-        <p:style>
-          <a:lnRef idx="2">
-            <a:schemeClr val="accent1">
-              <a:shade val="50000"/>
-            </a:schemeClr>
-          </a:lnRef>
-          <a:fillRef idx="1">
-            <a:schemeClr val="accent1"/>
-          </a:fillRef>
-          <a:effectRef idx="0">
-            <a:schemeClr val="accent1"/>
-          </a:effectRef>
-          <a:fontRef idx="minor">
-            <a:schemeClr val="lt1"/>
-          </a:fontRef>
-        </p:style>
-        <p:txBody>
-          <a:bodyPr rtlCol="0" anchor="ctr"/>
-          <a:lstStyle/>
-          <a:p>
-            <a:pPr algn="ctr"/>
-            <a:endParaRPr kumimoji="1" lang="ja-JP" altLang="en-US"/>
-          </a:p>
-        </p:txBody>
-      </p:sp>
-      <p:sp>
-        <p:nvSpPr>
-          <p:cNvPr id="90" name="円柱 89"/>
-          <p:cNvSpPr/>
-          <p:nvPr/>
-        </p:nvSpPr>
-        <p:spPr>
-          <a:xfrm>
-            <a:off x="1766462" y="6092536"/>
-            <a:ext cx="3637920" cy="1096855"/>
-          </a:xfrm>
-          <a:prstGeom prst="can">
-            <a:avLst/>
-          </a:prstGeom>
-        </p:spPr>
-        <p:style>
-          <a:lnRef idx="1">
-            <a:schemeClr val="accent3"/>
-          </a:lnRef>
-          <a:fillRef idx="2">
-            <a:schemeClr val="accent3"/>
-          </a:fillRef>
-          <a:effectRef idx="1">
-            <a:schemeClr val="accent3"/>
-          </a:effectRef>
-          <a:fontRef idx="minor">
-            <a:schemeClr val="dk1"/>
-          </a:fontRef>
-        </p:style>
-        <p:txBody>
-          <a:bodyPr rtlCol="0" anchor="ctr"/>
-          <a:lstStyle/>
-          <a:p>
-            <a:pPr algn="ctr"/>
-            <a:r>
-              <a:rPr lang="en-US" altLang="ja-JP" dirty="0" smtClean="0"/>
-              <a:t>PostgreSQL</a:t>
-            </a:r>
-          </a:p>
-        </p:txBody>
-      </p:sp>
-      <p:sp>
-        <p:nvSpPr>
-          <p:cNvPr id="91" name="テキスト ボックス 90"/>
-          <p:cNvSpPr txBox="1"/>
-          <p:nvPr/>
-        </p:nvSpPr>
-        <p:spPr>
-          <a:xfrm>
-            <a:off x="3333927" y="6051098"/>
-            <a:ext cx="697627" cy="369332"/>
-          </a:xfrm>
-          <a:prstGeom prst="rect">
-            <a:avLst/>
-          </a:prstGeom>
-          <a:noFill/>
-        </p:spPr>
-        <p:txBody>
-          <a:bodyPr wrap="none" rtlCol="0">
-            <a:spAutoFit/>
-          </a:bodyPr>
-          <a:lstStyle/>
-          <a:p>
-            <a:r>
-              <a:rPr kumimoji="1" lang="en-US" altLang="ja-JP" smtClean="0"/>
-              <a:t>5432</a:t>
-            </a:r>
-            <a:endParaRPr kumimoji="1" lang="ja-JP" altLang="en-US" dirty="0"/>
-          </a:p>
-        </p:txBody>
-      </p:sp>
       <p:cxnSp>
         <p:nvCxnSpPr>
-          <p:cNvPr id="99" name="直線矢印コネクタ 98"/>
+          <p:cNvPr id="142" name="直線矢印コネクタ 141"/>
           <p:cNvCxnSpPr>
-            <a:stCxn id="36" idx="2"/>
-            <a:endCxn id="11" idx="4"/>
+            <a:endCxn id="94" idx="0"/>
           </p:cNvCxnSpPr>
           <p:nvPr/>
         </p:nvCxnSpPr>
         <p:spPr>
-          <a:xfrm rot="5400000">
-            <a:off x="10052609" y="5488597"/>
-            <a:ext cx="1523844" cy="730759"/>
-          </a:xfrm>
-          <a:prstGeom prst="bentConnector2">
-            <a:avLst/>
+          <a:xfrm rot="16200000" flipH="1">
+            <a:off x="13311603" y="351229"/>
+            <a:ext cx="598857" cy="1904"/>
+          </a:xfrm>
+          <a:prstGeom prst="bentConnector3">
+            <a:avLst>
+              <a:gd name="adj1" fmla="val 50000"/>
+            </a:avLst>
           </a:prstGeom>
           <a:ln w="38100">
             <a:solidFill>
-              <a:schemeClr val="bg1">
-                <a:lumMod val="65000"/>
+              <a:schemeClr val="accent6">
+                <a:lumMod val="60000"/>
+                <a:lumOff val="40000"/>
               </a:schemeClr>
             </a:solidFill>
             <a:tailEnd type="triangle"/>
@@ -7413,22 +8368,28 @@
       </p:cxnSp>
       <p:pic>
         <p:nvPicPr>
-          <p:cNvPr id="96" name="図 95"/>
+          <p:cNvPr id="146" name="Picture 3" descr="AWS-Management-Console.png"/>
           <p:cNvPicPr>
             <a:picLocks noChangeAspect="1"/>
           </p:cNvPicPr>
           <p:nvPr/>
         </p:nvPicPr>
         <p:blipFill>
-          <a:blip r:embed="rId7"/>
+          <a:blip r:embed="rId12">
+            <a:extLst>
+              <a:ext uri="{28A0092B-C50C-407E-A947-70E740481C1C}">
+                <a14:useLocalDpi xmlns:a14="http://schemas.microsoft.com/office/drawing/2010/main" val="0"/>
+              </a:ext>
+            </a:extLst>
+          </a:blip>
           <a:stretch>
             <a:fillRect/>
           </a:stretch>
         </p:blipFill>
         <p:spPr>
           <a:xfrm>
-            <a:off x="6974450" y="8616475"/>
-            <a:ext cx="647369" cy="375474"/>
+            <a:off x="13265764" y="-543280"/>
+            <a:ext cx="665507" cy="665507"/>
           </a:xfrm>
           <a:prstGeom prst="rect">
             <a:avLst/>
@@ -7437,14 +8398,14 @@
       </p:pic>
       <p:sp>
         <p:nvSpPr>
-          <p:cNvPr id="109" name="テキスト ボックス 108"/>
+          <p:cNvPr id="147" name="TextBox 18"/>
           <p:cNvSpPr txBox="1"/>
           <p:nvPr/>
         </p:nvSpPr>
         <p:spPr>
           <a:xfrm>
-            <a:off x="6688186" y="8980059"/>
-            <a:ext cx="1285929" cy="276999"/>
+            <a:off x="13056303" y="232909"/>
+            <a:ext cx="1078992" cy="155448"/>
           </a:xfrm>
           <a:prstGeom prst="rect">
             <a:avLst/>
@@ -7452,196 +8413,33 @@
           <a:noFill/>
         </p:spPr>
         <p:txBody>
-          <a:bodyPr wrap="none" rtlCol="0">
-            <a:spAutoFit/>
+          <a:bodyPr wrap="square" lIns="0" tIns="0" rIns="0" bIns="0" rtlCol="0">
+            <a:noAutofit/>
           </a:bodyPr>
           <a:lstStyle/>
           <a:p>
             <a:pPr algn="ctr"/>
             <a:r>
-              <a:rPr kumimoji="1" lang="en-US" altLang="ja-JP" sz="1200" dirty="0" smtClean="0"/>
-              <a:t>PostgreSQL 9.4</a:t>
-            </a:r>
-            <a:endParaRPr kumimoji="1" lang="ja-JP" altLang="en-US" sz="1200" dirty="0"/>
-          </a:p>
-        </p:txBody>
-      </p:sp>
-      <p:pic>
-        <p:nvPicPr>
-          <p:cNvPr id="110" name="図 109"/>
-          <p:cNvPicPr>
-            <a:picLocks noChangeAspect="1"/>
-          </p:cNvPicPr>
-          <p:nvPr/>
-        </p:nvPicPr>
-        <p:blipFill>
-          <a:blip r:embed="rId7"/>
-          <a:stretch>
-            <a:fillRect/>
-          </a:stretch>
-        </p:blipFill>
-        <p:spPr>
-          <a:xfrm>
-            <a:off x="4647543" y="6655753"/>
-            <a:ext cx="647369" cy="375474"/>
-          </a:xfrm>
-          <a:prstGeom prst="rect">
-            <a:avLst/>
-          </a:prstGeom>
-        </p:spPr>
-      </p:pic>
-      <p:sp>
-        <p:nvSpPr>
-          <p:cNvPr id="111" name="テキスト ボックス 110"/>
-          <p:cNvSpPr txBox="1"/>
-          <p:nvPr/>
-        </p:nvSpPr>
-        <p:spPr>
-          <a:xfrm>
-            <a:off x="5936186" y="6427277"/>
-            <a:ext cx="649567" cy="369332"/>
-          </a:xfrm>
-          <a:prstGeom prst="rect">
-            <a:avLst/>
-          </a:prstGeom>
-          <a:noFill/>
-        </p:spPr>
-        <p:txBody>
-          <a:bodyPr wrap="square" rtlCol="0">
-            <a:spAutoFit/>
-          </a:bodyPr>
-          <a:lstStyle/>
-          <a:p>
-            <a:r>
-              <a:rPr lang="en-US" altLang="ja-JP" smtClean="0">
-                <a:solidFill>
-                  <a:schemeClr val="bg1">
-                    <a:lumMod val="50000"/>
-                  </a:schemeClr>
-                </a:solidFill>
+              <a:rPr lang="en-US" sz="1000" smtClean="0">
+                <a:latin typeface="Helvetica Neue"/>
+                <a:cs typeface="Helvetica Neue"/>
               </a:rPr>
-              <a:t>OR</a:t>
-            </a:r>
-            <a:endParaRPr kumimoji="1" lang="ja-JP" altLang="en-US" dirty="0">
-              <a:solidFill>
-                <a:schemeClr val="bg1">
-                  <a:lumMod val="50000"/>
-                </a:schemeClr>
-              </a:solidFill>
+              <a:t>SQS Web </a:t>
+            </a:r>
+            <a:r>
+              <a:rPr lang="en-US" sz="1000" smtClean="0">
+                <a:latin typeface="Helvetica Neue"/>
+                <a:cs typeface="Helvetica Neue"/>
+              </a:rPr>
+              <a:t>Console</a:t>
+            </a:r>
+            <a:endParaRPr lang="en-US" sz="1000" dirty="0">
+              <a:latin typeface="Helvetica Neue"/>
+              <a:cs typeface="Helvetica Neue"/>
             </a:endParaRPr>
           </a:p>
         </p:txBody>
       </p:sp>
-      <p:pic>
-        <p:nvPicPr>
-          <p:cNvPr id="107" name="図 106"/>
-          <p:cNvPicPr>
-            <a:picLocks noChangeAspect="1"/>
-          </p:cNvPicPr>
-          <p:nvPr/>
-        </p:nvPicPr>
-        <p:blipFill>
-          <a:blip r:embed="rId8"/>
-          <a:stretch>
-            <a:fillRect/>
-          </a:stretch>
-        </p:blipFill>
-        <p:spPr>
-          <a:xfrm>
-            <a:off x="377971" y="776518"/>
-            <a:ext cx="1096979" cy="1171833"/>
-          </a:xfrm>
-          <a:prstGeom prst="rect">
-            <a:avLst/>
-          </a:prstGeom>
-          <a:solidFill>
-            <a:schemeClr val="accent4">
-              <a:lumMod val="20000"/>
-              <a:lumOff val="80000"/>
-            </a:schemeClr>
-          </a:solidFill>
-          <a:ln>
-            <a:solidFill>
-              <a:schemeClr val="accent4">
-                <a:lumMod val="20000"/>
-                <a:lumOff val="80000"/>
-              </a:schemeClr>
-            </a:solidFill>
-          </a:ln>
-        </p:spPr>
-      </p:pic>
-      <p:pic>
-        <p:nvPicPr>
-          <p:cNvPr id="116" name="図 115"/>
-          <p:cNvPicPr>
-            <a:picLocks noChangeAspect="1"/>
-          </p:cNvPicPr>
-          <p:nvPr/>
-        </p:nvPicPr>
-        <p:blipFill>
-          <a:blip r:embed="rId9"/>
-          <a:stretch>
-            <a:fillRect/>
-          </a:stretch>
-        </p:blipFill>
-        <p:spPr>
-          <a:xfrm>
-            <a:off x="388422" y="5978395"/>
-            <a:ext cx="1065224" cy="1310615"/>
-          </a:xfrm>
-          <a:prstGeom prst="rect">
-            <a:avLst/>
-          </a:prstGeom>
-        </p:spPr>
-      </p:pic>
-      <p:pic>
-        <p:nvPicPr>
-          <p:cNvPr id="136" name="図 135"/>
-          <p:cNvPicPr>
-            <a:picLocks noChangeAspect="1"/>
-          </p:cNvPicPr>
-          <p:nvPr/>
-        </p:nvPicPr>
-        <p:blipFill>
-          <a:blip r:embed="rId10"/>
-          <a:stretch>
-            <a:fillRect/>
-          </a:stretch>
-        </p:blipFill>
-        <p:spPr>
-          <a:xfrm>
-            <a:off x="487124" y="440156"/>
-            <a:ext cx="877000" cy="456040"/>
-          </a:xfrm>
-          <a:prstGeom prst="rect">
-            <a:avLst/>
-          </a:prstGeom>
-        </p:spPr>
-      </p:pic>
-      <p:pic>
-        <p:nvPicPr>
-          <p:cNvPr id="140" name="図 139"/>
-          <p:cNvPicPr>
-            <a:picLocks noChangeAspect="1"/>
-          </p:cNvPicPr>
-          <p:nvPr/>
-        </p:nvPicPr>
-        <p:blipFill>
-          <a:blip r:embed="rId10"/>
-          <a:stretch>
-            <a:fillRect/>
-          </a:stretch>
-        </p:blipFill>
-        <p:spPr>
-          <a:xfrm>
-            <a:off x="490727" y="5546014"/>
-            <a:ext cx="877000" cy="456040"/>
-          </a:xfrm>
-          <a:prstGeom prst="rect">
-            <a:avLst/>
-          </a:prstGeom>
-        </p:spPr>
-      </p:pic>
     </p:spTree>
     <p:extLst>
       <p:ext uri="{BB962C8B-B14F-4D97-AF65-F5344CB8AC3E}">

</xml_diff>